<commit_message>
Slides para socio e PI
</commit_message>
<xml_diff>
--- a/Socioemocional/Slides para dar aula/Escopo e Restrições.pptx
+++ b/Socioemocional/Slides para dar aula/Escopo e Restrições.pptx
@@ -11,6 +11,9 @@
     <p:sldId id="260" r:id="rId5"/>
     <p:sldId id="259" r:id="rId6"/>
     <p:sldId id="261" r:id="rId7"/>
+    <p:sldId id="262" r:id="rId8"/>
+    <p:sldId id="263" r:id="rId9"/>
+    <p:sldId id="264" r:id="rId10"/>
   </p:sldIdLst>
   <p:sldSz cx="12192000" cy="6858000"/>
   <p:notesSz cx="6858000" cy="9144000"/>
@@ -369,7 +372,7 @@
             <a:fld id="{B61BEF0D-F0BB-DE4B-95CE-6DB70DBA9567}" type="datetimeFigureOut">
               <a:rPr lang="en-US" dirty="0"/>
               <a:pPr/>
-              <a:t>4/1/2022</a:t>
+              <a:t>4/3/2022</a:t>
             </a:fld>
             <a:endParaRPr lang="en-US" dirty="0"/>
           </a:p>
@@ -444,7 +447,7 @@
             <a:fld id="{D57F1E4F-1CFF-5643-939E-217C01CDF565}" type="slidenum">
               <a:rPr lang="en-US" dirty="0"/>
               <a:pPr/>
-              <a:t>‹#›</a:t>
+              <a:t>‹nº›</a:t>
             </a:fld>
             <a:endParaRPr lang="en-US" dirty="0"/>
           </a:p>
@@ -631,7 +634,7 @@
             <a:fld id="{B61BEF0D-F0BB-DE4B-95CE-6DB70DBA9567}" type="datetimeFigureOut">
               <a:rPr lang="en-US" dirty="0"/>
               <a:pPr/>
-              <a:t>4/1/2022</a:t>
+              <a:t>4/3/2022</a:t>
             </a:fld>
             <a:endParaRPr lang="en-US" dirty="0"/>
           </a:p>
@@ -674,7 +677,7 @@
             <a:fld id="{D57F1E4F-1CFF-5643-939E-217C01CDF565}" type="slidenum">
               <a:rPr lang="en-US" dirty="0"/>
               <a:pPr/>
-              <a:t>‹#›</a:t>
+              <a:t>‹nº›</a:t>
             </a:fld>
             <a:endParaRPr lang="en-US" dirty="0"/>
           </a:p>
@@ -866,7 +869,7 @@
             <a:fld id="{B61BEF0D-F0BB-DE4B-95CE-6DB70DBA9567}" type="datetimeFigureOut">
               <a:rPr lang="en-US" dirty="0"/>
               <a:pPr/>
-              <a:t>4/1/2022</a:t>
+              <a:t>4/3/2022</a:t>
             </a:fld>
             <a:endParaRPr lang="en-US" dirty="0"/>
           </a:p>
@@ -930,7 +933,7 @@
             <a:fld id="{D57F1E4F-1CFF-5643-939E-217C01CDF565}" type="slidenum">
               <a:rPr lang="en-US" dirty="0"/>
               <a:pPr/>
-              <a:t>‹#›</a:t>
+              <a:t>‹nº›</a:t>
             </a:fld>
             <a:endParaRPr lang="en-US" dirty="0"/>
           </a:p>
@@ -1106,7 +1109,7 @@
             <a:fld id="{B61BEF0D-F0BB-DE4B-95CE-6DB70DBA9567}" type="datetimeFigureOut">
               <a:rPr lang="en-US" dirty="0"/>
               <a:pPr/>
-              <a:t>4/1/2022</a:t>
+              <a:t>4/3/2022</a:t>
             </a:fld>
             <a:endParaRPr lang="en-US" dirty="0"/>
           </a:p>
@@ -1154,7 +1157,7 @@
             <a:fld id="{D57F1E4F-1CFF-5643-939E-217C01CDF565}" type="slidenum">
               <a:rPr lang="en-US" dirty="0"/>
               <a:pPr/>
-              <a:t>‹#›</a:t>
+              <a:t>‹nº›</a:t>
             </a:fld>
             <a:endParaRPr lang="en-US" dirty="0"/>
           </a:p>
@@ -1414,7 +1417,7 @@
             <a:fld id="{B61BEF0D-F0BB-DE4B-95CE-6DB70DBA9567}" type="datetimeFigureOut">
               <a:rPr lang="en-US" dirty="0"/>
               <a:pPr/>
-              <a:t>4/1/2022</a:t>
+              <a:t>4/3/2022</a:t>
             </a:fld>
             <a:endParaRPr lang="en-US" dirty="0"/>
           </a:p>
@@ -1479,7 +1482,7 @@
             <a:fld id="{D57F1E4F-1CFF-5643-939E-217C01CDF565}" type="slidenum">
               <a:rPr lang="en-US" dirty="0"/>
               <a:pPr/>
-              <a:t>‹#›</a:t>
+              <a:t>‹nº›</a:t>
             </a:fld>
             <a:endParaRPr lang="en-US" dirty="0"/>
           </a:p>
@@ -1715,7 +1718,7 @@
             <a:fld id="{B61BEF0D-F0BB-DE4B-95CE-6DB70DBA9567}" type="datetimeFigureOut">
               <a:rPr lang="en-US" dirty="0"/>
               <a:pPr/>
-              <a:t>4/1/2022</a:t>
+              <a:t>4/3/2022</a:t>
             </a:fld>
             <a:endParaRPr lang="en-US" dirty="0"/>
           </a:p>
@@ -1758,7 +1761,7 @@
             <a:fld id="{D57F1E4F-1CFF-5643-939E-217C01CDF565}" type="slidenum">
               <a:rPr lang="en-US" dirty="0"/>
               <a:pPr/>
-              <a:t>‹#›</a:t>
+              <a:t>‹nº›</a:t>
             </a:fld>
             <a:endParaRPr lang="en-US" dirty="0"/>
           </a:p>
@@ -2136,7 +2139,7 @@
             <a:fld id="{B61BEF0D-F0BB-DE4B-95CE-6DB70DBA9567}" type="datetimeFigureOut">
               <a:rPr lang="en-US" dirty="0"/>
               <a:pPr/>
-              <a:t>4/1/2022</a:t>
+              <a:t>4/3/2022</a:t>
             </a:fld>
             <a:endParaRPr lang="en-US" dirty="0"/>
           </a:p>
@@ -2179,7 +2182,7 @@
             <a:fld id="{D57F1E4F-1CFF-5643-939E-217C01CDF565}" type="slidenum">
               <a:rPr lang="en-US" dirty="0"/>
               <a:pPr/>
-              <a:t>‹#›</a:t>
+              <a:t>‹nº›</a:t>
             </a:fld>
             <a:endParaRPr lang="en-US" dirty="0"/>
           </a:p>
@@ -2299,7 +2302,7 @@
             <a:fld id="{B61BEF0D-F0BB-DE4B-95CE-6DB70DBA9567}" type="datetimeFigureOut">
               <a:rPr lang="en-US" dirty="0"/>
               <a:pPr/>
-              <a:t>4/1/2022</a:t>
+              <a:t>4/3/2022</a:t>
             </a:fld>
             <a:endParaRPr lang="en-US" dirty="0"/>
           </a:p>
@@ -2342,7 +2345,7 @@
             <a:fld id="{D57F1E4F-1CFF-5643-939E-217C01CDF565}" type="slidenum">
               <a:rPr lang="en-US" dirty="0"/>
               <a:pPr/>
-              <a:t>‹#›</a:t>
+              <a:t>‹nº›</a:t>
             </a:fld>
             <a:endParaRPr lang="en-US" dirty="0"/>
           </a:p>
@@ -2396,7 +2399,7 @@
             <a:fld id="{B61BEF0D-F0BB-DE4B-95CE-6DB70DBA9567}" type="datetimeFigureOut">
               <a:rPr lang="en-US" dirty="0"/>
               <a:pPr/>
-              <a:t>4/1/2022</a:t>
+              <a:t>4/3/2022</a:t>
             </a:fld>
             <a:endParaRPr lang="en-US" dirty="0"/>
           </a:p>
@@ -2439,7 +2442,7 @@
             <a:fld id="{D57F1E4F-1CFF-5643-939E-217C01CDF565}" type="slidenum">
               <a:rPr lang="en-US" dirty="0"/>
               <a:pPr/>
-              <a:t>‹#›</a:t>
+              <a:t>‹nº›</a:t>
             </a:fld>
             <a:endParaRPr lang="en-US" dirty="0"/>
           </a:p>
@@ -2774,7 +2777,7 @@
             <a:fld id="{B61BEF0D-F0BB-DE4B-95CE-6DB70DBA9567}" type="datetimeFigureOut">
               <a:rPr lang="en-US" dirty="0"/>
               <a:pPr/>
-              <a:t>4/1/2022</a:t>
+              <a:t>4/3/2022</a:t>
             </a:fld>
             <a:endParaRPr lang="en-US" dirty="0"/>
           </a:p>
@@ -2839,7 +2842,7 @@
             <a:fld id="{D57F1E4F-1CFF-5643-939E-217C01CDF565}" type="slidenum">
               <a:rPr lang="en-US" dirty="0"/>
               <a:pPr/>
-              <a:t>‹#›</a:t>
+              <a:t>‹nº›</a:t>
             </a:fld>
             <a:endParaRPr lang="en-US" dirty="0"/>
           </a:p>
@@ -3060,7 +3063,7 @@
             <a:fld id="{B61BEF0D-F0BB-DE4B-95CE-6DB70DBA9567}" type="datetimeFigureOut">
               <a:rPr lang="en-US" dirty="0"/>
               <a:pPr/>
-              <a:t>4/1/2022</a:t>
+              <a:t>4/3/2022</a:t>
             </a:fld>
             <a:endParaRPr lang="en-US" dirty="0"/>
           </a:p>
@@ -3103,7 +3106,7 @@
             <a:fld id="{D57F1E4F-1CFF-5643-939E-217C01CDF565}" type="slidenum">
               <a:rPr lang="en-US" dirty="0"/>
               <a:pPr/>
-              <a:t>‹#›</a:t>
+              <a:t>‹nº›</a:t>
             </a:fld>
             <a:endParaRPr lang="en-US" dirty="0"/>
           </a:p>
@@ -3299,7 +3302,7 @@
             <a:fld id="{B61BEF0D-F0BB-DE4B-95CE-6DB70DBA9567}" type="datetimeFigureOut">
               <a:rPr lang="en-US" dirty="0"/>
               <a:pPr/>
-              <a:t>4/1/2022</a:t>
+              <a:t>4/3/2022</a:t>
             </a:fld>
             <a:endParaRPr lang="en-US" dirty="0"/>
           </a:p>
@@ -3374,7 +3377,7 @@
             <a:fld id="{D57F1E4F-1CFF-5643-939E-217C01CDF565}" type="slidenum">
               <a:rPr lang="en-US" dirty="0"/>
               <a:pPr/>
-              <a:t>‹#›</a:t>
+              <a:t>‹nº›</a:t>
             </a:fld>
             <a:endParaRPr lang="en-US" dirty="0"/>
           </a:p>
@@ -3943,6 +3946,53 @@
               <a:t>Escopo e Requisitos</a:t>
             </a:r>
             <a:endParaRPr lang="pt-BR" dirty="0"/>
+          </a:p>
+        </p:txBody>
+      </p:sp>
+      <p:sp>
+        <p:nvSpPr>
+          <p:cNvPr id="3" name="TextBox 3">
+            <a:extLst>
+              <a:ext uri="{FF2B5EF4-FFF2-40B4-BE49-F238E27FC236}">
+                <a16:creationId xmlns:a16="http://schemas.microsoft.com/office/drawing/2014/main" id="{45714B7B-BAC1-4F91-A551-27F7A6D6617C}"/>
+              </a:ext>
+            </a:extLst>
+          </p:cNvPr>
+          <p:cNvSpPr txBox="1"/>
+          <p:nvPr/>
+        </p:nvSpPr>
+        <p:spPr>
+          <a:xfrm>
+            <a:off x="482848" y="5983779"/>
+            <a:ext cx="4957314" cy="338554"/>
+          </a:xfrm>
+          <a:prstGeom prst="rect">
+            <a:avLst/>
+          </a:prstGeom>
+          <a:noFill/>
+        </p:spPr>
+        <p:txBody>
+          <a:bodyPr rot="0" spcFirstLastPara="0" vertOverflow="overflow" horzOverflow="overflow" vert="horz" wrap="square" lIns="91440" tIns="45720" rIns="91440" bIns="45720" numCol="1" spcCol="0" rtlCol="0" fromWordArt="0" anchor="t" anchorCtr="0" forceAA="0" compatLnSpc="1">
+            <a:prstTxWarp prst="textNoShape">
+              <a:avLst/>
+            </a:prstTxWarp>
+            <a:spAutoFit/>
+          </a:bodyPr>
+          <a:lstStyle/>
+          <a:p>
+            <a:r>
+              <a:rPr lang="pt-BR" sz="1600" b="1" dirty="0">
+                <a:solidFill>
+                  <a:srgbClr val="FFFFFF"/>
+                </a:solidFill>
+                <a:latin typeface="Bahnschrift" panose="020B0502040204020203" pitchFamily="34" charset="0"/>
+                <a:cs typeface="Aharoni"/>
+              </a:rPr>
+              <a:t>Nome: Danylo Dias Gomes | RA: 02221004</a:t>
+            </a:r>
+            <a:endParaRPr lang="pt-BR" sz="900" dirty="0">
+              <a:latin typeface="Bahnschrift" panose="020B0502040204020203" pitchFamily="34" charset="0"/>
+            </a:endParaRPr>
           </a:p>
         </p:txBody>
       </p:sp>
@@ -4393,7 +4443,7 @@
                 <a:ea typeface="+mj-ea"/>
                 <a:cs typeface="+mj-cs"/>
               </a:rPr>
-              <a:t>Escopo</a:t>
+              <a:t>O que é escopo?</a:t>
             </a:r>
           </a:p>
         </p:txBody>
@@ -4454,10 +4504,10 @@
       </p:sp>
       <p:pic>
         <p:nvPicPr>
-          <p:cNvPr id="7" name="Picture 7" descr="A picture containing text, indoor, counter, several&#10;&#10;Description automatically generated">
+          <p:cNvPr id="10" name="Imagem 9">
             <a:extLst>
               <a:ext uri="{FF2B5EF4-FFF2-40B4-BE49-F238E27FC236}">
-                <a16:creationId xmlns:a16="http://schemas.microsoft.com/office/drawing/2014/main" id="{7094EE89-F05E-C8B3-5326-7C1DD91A309F}"/>
+                <a16:creationId xmlns:a16="http://schemas.microsoft.com/office/drawing/2014/main" id="{547EDB3C-02FF-48B4-8327-3BC815D4FB92}"/>
               </a:ext>
             </a:extLst>
           </p:cNvPr>
@@ -4466,193 +4516,36 @@
           </p:cNvPicPr>
           <p:nvPr/>
         </p:nvPicPr>
-        <p:blipFill rotWithShape="1">
+        <p:blipFill>
           <a:blip r:embed="rId2"/>
-          <a:srcRect l="14749" r="22493"/>
-          <a:stretch/>
+          <a:stretch>
+            <a:fillRect/>
+          </a:stretch>
         </p:blipFill>
         <p:spPr>
           <a:xfrm>
-            <a:off x="4654295" y="457200"/>
-            <a:ext cx="7086151" cy="5899650"/>
-          </a:xfrm>
-          <a:prstGeom prst="rect">
-            <a:avLst/>
-          </a:prstGeom>
+            <a:off x="5393344" y="1472617"/>
+            <a:ext cx="6160036" cy="4114904"/>
+          </a:xfrm>
+          <a:prstGeom prst="rect">
+            <a:avLst/>
+          </a:prstGeom>
+          <a:ln w="228600" cap="sq" cmpd="thickThin">
+            <a:solidFill>
+              <a:schemeClr val="accent2">
+                <a:lumMod val="75000"/>
+              </a:schemeClr>
+            </a:solidFill>
+            <a:prstDash val="solid"/>
+            <a:miter lim="800000"/>
+          </a:ln>
+          <a:effectLst>
+            <a:innerShdw blurRad="76200">
+              <a:srgbClr val="000000"/>
+            </a:innerShdw>
+          </a:effectLst>
         </p:spPr>
       </p:pic>
-      <p:sp>
-        <p:nvSpPr>
-          <p:cNvPr id="8" name="TextBox 7">
-            <a:extLst>
-              <a:ext uri="{FF2B5EF4-FFF2-40B4-BE49-F238E27FC236}">
-                <a16:creationId xmlns:a16="http://schemas.microsoft.com/office/drawing/2014/main" id="{FD5AA5F6-578F-0F2F-9958-1AAF28FC27F1}"/>
-              </a:ext>
-            </a:extLst>
-          </p:cNvPr>
-          <p:cNvSpPr txBox="1"/>
-          <p:nvPr/>
-        </p:nvSpPr>
-        <p:spPr>
-          <a:xfrm>
-            <a:off x="1503872" y="4379343"/>
-            <a:ext cx="2743200" cy="2308324"/>
-          </a:xfrm>
-          <a:prstGeom prst="rect">
-            <a:avLst/>
-          </a:prstGeom>
-          <a:solidFill>
-            <a:schemeClr val="bg1"/>
-          </a:solidFill>
-        </p:spPr>
-        <p:txBody>
-          <a:bodyPr rot="0" spcFirstLastPara="0" vertOverflow="overflow" horzOverflow="overflow" vert="horz" wrap="square" lIns="91440" tIns="45720" rIns="91440" bIns="45720" numCol="1" spcCol="0" rtlCol="0" fromWordArt="0" anchor="t" anchorCtr="0" forceAA="0" compatLnSpc="1">
-            <a:prstTxWarp prst="textNoShape">
-              <a:avLst/>
-            </a:prstTxWarp>
-            <a:spAutoFit/>
-          </a:bodyPr>
-          <a:lstStyle/>
-          <a:p>
-            <a:r>
-              <a:rPr lang="en-US" dirty="0"/>
-              <a:t>Dar </a:t>
-            </a:r>
-            <a:r>
-              <a:rPr lang="en-US" dirty="0" err="1"/>
-              <a:t>exemplo</a:t>
-            </a:r>
-            <a:r>
-              <a:rPr lang="en-US" dirty="0"/>
-              <a:t> da </a:t>
-            </a:r>
-            <a:r>
-              <a:rPr lang="en-US" dirty="0" err="1"/>
-              <a:t>padaria</a:t>
-            </a:r>
-            <a:r>
-              <a:rPr lang="en-US" dirty="0"/>
-              <a:t>, </a:t>
-            </a:r>
-            <a:r>
-              <a:rPr lang="en-US" dirty="0" err="1"/>
-              <a:t>problema</a:t>
-            </a:r>
-            <a:r>
-              <a:rPr lang="en-US" dirty="0"/>
-              <a:t> a ser </a:t>
-            </a:r>
-            <a:r>
-              <a:rPr lang="en-US" dirty="0" err="1"/>
-              <a:t>resolvido</a:t>
-            </a:r>
-            <a:r>
-              <a:rPr lang="en-US" dirty="0"/>
-              <a:t> do </a:t>
-            </a:r>
-            <a:r>
-              <a:rPr lang="en-US" dirty="0" err="1"/>
-              <a:t>pão</a:t>
-            </a:r>
-            <a:r>
-              <a:rPr lang="en-US" dirty="0"/>
-              <a:t> </a:t>
-            </a:r>
-            <a:r>
-              <a:rPr lang="en-US" dirty="0" err="1"/>
-              <a:t>esgotar</a:t>
-            </a:r>
-            <a:r>
-              <a:rPr lang="en-US" dirty="0"/>
-              <a:t> e </a:t>
-            </a:r>
-            <a:r>
-              <a:rPr lang="en-US" dirty="0" err="1"/>
-              <a:t>clientes</a:t>
-            </a:r>
-            <a:r>
-              <a:rPr lang="en-US" dirty="0"/>
-              <a:t> </a:t>
-            </a:r>
-            <a:r>
-              <a:rPr lang="en-US" dirty="0" err="1"/>
-              <a:t>ficarem</a:t>
-            </a:r>
-            <a:r>
-              <a:rPr lang="en-US" dirty="0"/>
-              <a:t> </a:t>
-            </a:r>
-            <a:r>
-              <a:rPr lang="en-US" dirty="0" err="1"/>
-              <a:t>sem</a:t>
-            </a:r>
-            <a:r>
-              <a:rPr lang="en-US" dirty="0"/>
-              <a:t> </a:t>
-            </a:r>
-            <a:r>
-              <a:rPr lang="en-US" dirty="0" err="1"/>
-              <a:t>pão</a:t>
-            </a:r>
-            <a:r>
-              <a:rPr lang="en-US" dirty="0"/>
-              <a:t>, </a:t>
-            </a:r>
-            <a:r>
-              <a:rPr lang="en-US" dirty="0" err="1"/>
-              <a:t>solução</a:t>
-            </a:r>
-            <a:r>
-              <a:rPr lang="en-US" dirty="0"/>
-              <a:t>: app para </a:t>
-            </a:r>
-            <a:r>
-              <a:rPr lang="en-US" dirty="0" err="1"/>
-              <a:t>clientes</a:t>
-            </a:r>
-            <a:r>
-              <a:rPr lang="en-US" dirty="0"/>
-              <a:t> </a:t>
-            </a:r>
-            <a:r>
-              <a:rPr lang="en-US" dirty="0" err="1"/>
-              <a:t>fidelizados</a:t>
-            </a:r>
-            <a:r>
-              <a:rPr lang="en-US" dirty="0"/>
-              <a:t> </a:t>
-            </a:r>
-            <a:r>
-              <a:rPr lang="en-US" dirty="0" err="1"/>
-              <a:t>terem</a:t>
-            </a:r>
-            <a:r>
-              <a:rPr lang="en-US" dirty="0"/>
-              <a:t> </a:t>
-            </a:r>
-            <a:r>
-              <a:rPr lang="en-US" dirty="0" err="1"/>
-              <a:t>preferencia</a:t>
-            </a:r>
-            <a:r>
-              <a:rPr lang="en-US" dirty="0"/>
-              <a:t> e </a:t>
-            </a:r>
-            <a:r>
-              <a:rPr lang="en-US" dirty="0" err="1"/>
-              <a:t>reservarem</a:t>
-            </a:r>
-            <a:r>
-              <a:rPr lang="en-US" dirty="0"/>
-              <a:t> </a:t>
-            </a:r>
-            <a:r>
-              <a:rPr lang="en-US" dirty="0" err="1"/>
-              <a:t>pão</a:t>
-            </a:r>
-          </a:p>
-        </p:txBody>
-      </p:sp>
     </p:spTree>
     <p:extLst>
       <p:ext uri="{BB962C8B-B14F-4D97-AF65-F5344CB8AC3E}">
@@ -5107,35 +5000,6 @@
           </a:fontRef>
         </p:style>
       </p:sp>
-      <p:pic>
-        <p:nvPicPr>
-          <p:cNvPr id="6" name="Picture 7" descr="A picture containing text&#10;&#10;Description automatically generated">
-            <a:extLst>
-              <a:ext uri="{FF2B5EF4-FFF2-40B4-BE49-F238E27FC236}">
-                <a16:creationId xmlns:a16="http://schemas.microsoft.com/office/drawing/2014/main" id="{96B8DE4D-C929-03BA-8F31-EA62CEE32E3D}"/>
-              </a:ext>
-            </a:extLst>
-          </p:cNvPr>
-          <p:cNvPicPr>
-            <a:picLocks noChangeAspect="1"/>
-          </p:cNvPicPr>
-          <p:nvPr/>
-        </p:nvPicPr>
-        <p:blipFill rotWithShape="1">
-          <a:blip r:embed="rId2"/>
-          <a:srcRect l="6084" r="14041" b="-1"/>
-          <a:stretch/>
-        </p:blipFill>
-        <p:spPr>
-          <a:xfrm>
-            <a:off x="4654295" y="457200"/>
-            <a:ext cx="7086151" cy="5899650"/>
-          </a:xfrm>
-          <a:prstGeom prst="rect">
-            <a:avLst/>
-          </a:prstGeom>
-        </p:spPr>
-      </p:pic>
       <p:sp>
         <p:nvSpPr>
           <p:cNvPr id="8" name="TextBox 7">
@@ -5151,7 +5015,7 @@
         <p:spPr>
           <a:xfrm>
             <a:off x="638620" y="2934034"/>
-            <a:ext cx="3511233" cy="1192071"/>
+            <a:ext cx="3603210" cy="1192071"/>
           </a:xfrm>
           <a:prstGeom prst="rect">
             <a:avLst/>
@@ -5162,7 +5026,7 @@
             <a:prstTxWarp prst="textNoShape">
               <a:avLst/>
             </a:prstTxWarp>
-            <a:normAutofit/>
+            <a:normAutofit fontScale="92500"/>
           </a:bodyPr>
           <a:lstStyle/>
           <a:p>
@@ -5183,11 +5047,76 @@
                 <a:ea typeface="+mj-ea"/>
                 <a:cs typeface="+mj-cs"/>
               </a:rPr>
-              <a:t>Escopo</a:t>
+              <a:t>A IMPORTÂNCIA</a:t>
             </a:r>
           </a:p>
+          <a:p>
+            <a:pPr algn="ctr" defTabSz="457200">
+              <a:spcBef>
+                <a:spcPct val="0"/>
+              </a:spcBef>
+              <a:spcAft>
+                <a:spcPts val="600"/>
+              </a:spcAft>
+            </a:pPr>
+            <a:r>
+              <a:rPr lang="pt-BR" sz="3600" cap="all" dirty="0">
+                <a:solidFill>
+                  <a:srgbClr val="FFFFFF"/>
+                </a:solidFill>
+                <a:latin typeface="+mj-lt"/>
+                <a:ea typeface="+mj-ea"/>
+                <a:cs typeface="+mj-cs"/>
+              </a:rPr>
+              <a:t>DO ESCOPO</a:t>
+            </a:r>
+          </a:p>
         </p:txBody>
       </p:sp>
+      <p:pic>
+        <p:nvPicPr>
+          <p:cNvPr id="4" name="Imagem 3">
+            <a:extLst>
+              <a:ext uri="{FF2B5EF4-FFF2-40B4-BE49-F238E27FC236}">
+                <a16:creationId xmlns:a16="http://schemas.microsoft.com/office/drawing/2014/main" id="{299318B0-F6BA-4F68-959D-F2628E7FB85F}"/>
+              </a:ext>
+            </a:extLst>
+          </p:cNvPr>
+          <p:cNvPicPr>
+            <a:picLocks noChangeAspect="1"/>
+          </p:cNvPicPr>
+          <p:nvPr/>
+        </p:nvPicPr>
+        <p:blipFill>
+          <a:blip r:embed="rId2"/>
+          <a:stretch>
+            <a:fillRect/>
+          </a:stretch>
+        </p:blipFill>
+        <p:spPr>
+          <a:xfrm>
+            <a:off x="5359415" y="1696506"/>
+            <a:ext cx="5715000" cy="3667125"/>
+          </a:xfrm>
+          <a:prstGeom prst="rect">
+            <a:avLst/>
+          </a:prstGeom>
+          <a:ln w="228600" cap="sq" cmpd="thickThin">
+            <a:solidFill>
+              <a:schemeClr val="accent2">
+                <a:lumMod val="75000"/>
+              </a:schemeClr>
+            </a:solidFill>
+            <a:prstDash val="solid"/>
+            <a:miter lim="800000"/>
+          </a:ln>
+          <a:effectLst>
+            <a:innerShdw blurRad="76200">
+              <a:srgbClr val="000000"/>
+            </a:innerShdw>
+          </a:effectLst>
+        </p:spPr>
+      </p:pic>
     </p:spTree>
     <p:extLst>
       <p:ext uri="{BB962C8B-B14F-4D97-AF65-F5344CB8AC3E}">
@@ -5642,41 +5571,12 @@
           </a:fontRef>
         </p:style>
       </p:sp>
-      <p:pic>
-        <p:nvPicPr>
-          <p:cNvPr id="2" name="Picture 2" descr="Icon&#10;&#10;Description automatically generated">
+      <p:sp>
+        <p:nvSpPr>
+          <p:cNvPr id="11" name="TextBox 7">
             <a:extLst>
               <a:ext uri="{FF2B5EF4-FFF2-40B4-BE49-F238E27FC236}">
-                <a16:creationId xmlns:a16="http://schemas.microsoft.com/office/drawing/2014/main" id="{B0ACD2E8-0311-026E-88D9-B0A1970C8543}"/>
-              </a:ext>
-            </a:extLst>
-          </p:cNvPr>
-          <p:cNvPicPr>
-            <a:picLocks noChangeAspect="1"/>
-          </p:cNvPicPr>
-          <p:nvPr/>
-        </p:nvPicPr>
-        <p:blipFill rotWithShape="1">
-          <a:blip r:embed="rId2"/>
-          <a:srcRect l="17623" r="19321" b="5"/>
-          <a:stretch/>
-        </p:blipFill>
-        <p:spPr>
-          <a:xfrm>
-            <a:off x="4654295" y="457200"/>
-            <a:ext cx="7086151" cy="5899650"/>
-          </a:xfrm>
-          <a:prstGeom prst="rect">
-            <a:avLst/>
-          </a:prstGeom>
-        </p:spPr>
-      </p:pic>
-      <p:sp>
-        <p:nvSpPr>
-          <p:cNvPr id="3" name="TextBox 2">
-            <a:extLst>
-              <a:ext uri="{FF2B5EF4-FFF2-40B4-BE49-F238E27FC236}">
-                <a16:creationId xmlns:a16="http://schemas.microsoft.com/office/drawing/2014/main" id="{A4FA63A2-15C6-2332-C913-4A619B53B8FB}"/>
+                <a16:creationId xmlns:a16="http://schemas.microsoft.com/office/drawing/2014/main" id="{32C20449-02C2-4709-B1B2-7EE4A09ECD79}"/>
               </a:ext>
             </a:extLst>
           </p:cNvPr>
@@ -5686,7 +5586,7 @@
         <p:spPr>
           <a:xfrm>
             <a:off x="638620" y="2934034"/>
-            <a:ext cx="3511233" cy="1192071"/>
+            <a:ext cx="3603210" cy="1192071"/>
           </a:xfrm>
           <a:prstGeom prst="rect">
             <a:avLst/>
@@ -5697,7 +5597,7 @@
             <a:prstTxWarp prst="textNoShape">
               <a:avLst/>
             </a:prstTxWarp>
-            <a:normAutofit/>
+            <a:normAutofit fontScale="92500"/>
           </a:bodyPr>
           <a:lstStyle/>
           <a:p>
@@ -5718,11 +5618,76 @@
                 <a:ea typeface="+mj-ea"/>
                 <a:cs typeface="+mj-cs"/>
               </a:rPr>
-              <a:t>Escopo</a:t>
+              <a:t>A IMPORTÂNCIA</a:t>
             </a:r>
           </a:p>
+          <a:p>
+            <a:pPr algn="ctr" defTabSz="457200">
+              <a:spcBef>
+                <a:spcPct val="0"/>
+              </a:spcBef>
+              <a:spcAft>
+                <a:spcPts val="600"/>
+              </a:spcAft>
+            </a:pPr>
+            <a:r>
+              <a:rPr lang="pt-BR" sz="3600" cap="all" dirty="0">
+                <a:solidFill>
+                  <a:srgbClr val="FFFFFF"/>
+                </a:solidFill>
+                <a:latin typeface="+mj-lt"/>
+                <a:ea typeface="+mj-ea"/>
+                <a:cs typeface="+mj-cs"/>
+              </a:rPr>
+              <a:t>DO ESCOPO</a:t>
+            </a:r>
+          </a:p>
         </p:txBody>
       </p:sp>
+      <p:pic>
+        <p:nvPicPr>
+          <p:cNvPr id="4" name="Imagem 3">
+            <a:extLst>
+              <a:ext uri="{FF2B5EF4-FFF2-40B4-BE49-F238E27FC236}">
+                <a16:creationId xmlns:a16="http://schemas.microsoft.com/office/drawing/2014/main" id="{C6BA60F6-1D5C-4A15-B887-4D490CFB35EA}"/>
+              </a:ext>
+            </a:extLst>
+          </p:cNvPr>
+          <p:cNvPicPr>
+            <a:picLocks noChangeAspect="1"/>
+          </p:cNvPicPr>
+          <p:nvPr/>
+        </p:nvPicPr>
+        <p:blipFill>
+          <a:blip r:embed="rId2"/>
+          <a:stretch>
+            <a:fillRect/>
+          </a:stretch>
+        </p:blipFill>
+        <p:spPr>
+          <a:xfrm>
+            <a:off x="5622895" y="1550460"/>
+            <a:ext cx="5459890" cy="3959218"/>
+          </a:xfrm>
+          <a:prstGeom prst="rect">
+            <a:avLst/>
+          </a:prstGeom>
+          <a:ln w="228600" cap="sq" cmpd="thickThin">
+            <a:solidFill>
+              <a:schemeClr val="accent2">
+                <a:lumMod val="75000"/>
+              </a:schemeClr>
+            </a:solidFill>
+            <a:prstDash val="solid"/>
+            <a:miter lim="800000"/>
+          </a:ln>
+          <a:effectLst>
+            <a:innerShdw blurRad="76200">
+              <a:srgbClr val="000000"/>
+            </a:innerShdw>
+          </a:effectLst>
+        </p:spPr>
+      </p:pic>
     </p:spTree>
     <p:extLst>
       <p:ext uri="{BB962C8B-B14F-4D97-AF65-F5344CB8AC3E}">
@@ -6177,35 +6142,6 @@
           </a:fontRef>
         </p:style>
       </p:sp>
-      <p:pic>
-        <p:nvPicPr>
-          <p:cNvPr id="2" name="Picture 2" descr="A picture containing text, person&#10;&#10;Description automatically generated">
-            <a:extLst>
-              <a:ext uri="{FF2B5EF4-FFF2-40B4-BE49-F238E27FC236}">
-                <a16:creationId xmlns:a16="http://schemas.microsoft.com/office/drawing/2014/main" id="{D76DEC5A-5876-BB1E-80DD-920B7B6B10E4}"/>
-              </a:ext>
-            </a:extLst>
-          </p:cNvPr>
-          <p:cNvPicPr>
-            <a:picLocks noChangeAspect="1"/>
-          </p:cNvPicPr>
-          <p:nvPr/>
-        </p:nvPicPr>
-        <p:blipFill rotWithShape="1">
-          <a:blip r:embed="rId2"/>
-          <a:srcRect l="7583" r="2336" b="3"/>
-          <a:stretch/>
-        </p:blipFill>
-        <p:spPr>
-          <a:xfrm>
-            <a:off x="4654295" y="457200"/>
-            <a:ext cx="7086151" cy="5899650"/>
-          </a:xfrm>
-          <a:prstGeom prst="rect">
-            <a:avLst/>
-          </a:prstGeom>
-        </p:spPr>
-      </p:pic>
       <p:sp>
         <p:nvSpPr>
           <p:cNvPr id="3" name="TextBox 2">
@@ -6253,11 +6189,55 @@
                 <a:ea typeface="+mj-ea"/>
                 <a:cs typeface="+mj-cs"/>
               </a:rPr>
-              <a:t>Escopo</a:t>
+              <a:t>O que são requisitos?</a:t>
             </a:r>
           </a:p>
         </p:txBody>
       </p:sp>
+      <p:pic>
+        <p:nvPicPr>
+          <p:cNvPr id="4" name="Imagem 3">
+            <a:extLst>
+              <a:ext uri="{FF2B5EF4-FFF2-40B4-BE49-F238E27FC236}">
+                <a16:creationId xmlns:a16="http://schemas.microsoft.com/office/drawing/2014/main" id="{7E5F2902-D4E0-4816-94F1-ADF0F5D5E777}"/>
+              </a:ext>
+            </a:extLst>
+          </p:cNvPr>
+          <p:cNvPicPr>
+            <a:picLocks noChangeAspect="1"/>
+          </p:cNvPicPr>
+          <p:nvPr/>
+        </p:nvPicPr>
+        <p:blipFill>
+          <a:blip r:embed="rId2"/>
+          <a:stretch>
+            <a:fillRect/>
+          </a:stretch>
+        </p:blipFill>
+        <p:spPr>
+          <a:xfrm>
+            <a:off x="5568591" y="1228343"/>
+            <a:ext cx="5984789" cy="4401314"/>
+          </a:xfrm>
+          <a:prstGeom prst="rect">
+            <a:avLst/>
+          </a:prstGeom>
+          <a:ln w="228600" cap="sq" cmpd="thickThin">
+            <a:solidFill>
+              <a:schemeClr val="accent2">
+                <a:lumMod val="75000"/>
+              </a:schemeClr>
+            </a:solidFill>
+            <a:prstDash val="solid"/>
+            <a:miter lim="800000"/>
+          </a:ln>
+          <a:effectLst>
+            <a:innerShdw blurRad="76200">
+              <a:srgbClr val="000000"/>
+            </a:innerShdw>
+          </a:effectLst>
+        </p:spPr>
+      </p:pic>
     </p:spTree>
     <p:extLst>
       <p:ext uri="{BB962C8B-B14F-4D97-AF65-F5344CB8AC3E}">
@@ -6712,41 +6692,12 @@
           </a:fontRef>
         </p:style>
       </p:sp>
-      <p:pic>
-        <p:nvPicPr>
-          <p:cNvPr id="4" name="Picture 4">
+      <p:sp>
+        <p:nvSpPr>
+          <p:cNvPr id="13" name="TextBox 7">
             <a:extLst>
               <a:ext uri="{FF2B5EF4-FFF2-40B4-BE49-F238E27FC236}">
-                <a16:creationId xmlns:a16="http://schemas.microsoft.com/office/drawing/2014/main" id="{8B68B5FC-1B36-6E1E-76A0-C684ADFC9117}"/>
-              </a:ext>
-            </a:extLst>
-          </p:cNvPr>
-          <p:cNvPicPr>
-            <a:picLocks noChangeAspect="1"/>
-          </p:cNvPicPr>
-          <p:nvPr/>
-        </p:nvPicPr>
-        <p:blipFill rotWithShape="1">
-          <a:blip r:embed="rId2"/>
-          <a:srcRect l="17500" r="8931" b="-1"/>
-          <a:stretch/>
-        </p:blipFill>
-        <p:spPr>
-          <a:xfrm>
-            <a:off x="4654295" y="457200"/>
-            <a:ext cx="7086151" cy="5899650"/>
-          </a:xfrm>
-          <a:prstGeom prst="rect">
-            <a:avLst/>
-          </a:prstGeom>
-        </p:spPr>
-      </p:pic>
-      <p:sp>
-        <p:nvSpPr>
-          <p:cNvPr id="5" name="TextBox 4">
-            <a:extLst>
-              <a:ext uri="{FF2B5EF4-FFF2-40B4-BE49-F238E27FC236}">
-                <a16:creationId xmlns:a16="http://schemas.microsoft.com/office/drawing/2014/main" id="{D05379FA-C841-F4CF-B14E-4A6726CACB0B}"/>
+                <a16:creationId xmlns:a16="http://schemas.microsoft.com/office/drawing/2014/main" id="{AE982F09-096F-4E31-9F65-2032E3CCFDC9}"/>
               </a:ext>
             </a:extLst>
           </p:cNvPr>
@@ -6756,7 +6707,7 @@
         <p:spPr>
           <a:xfrm>
             <a:off x="638620" y="2934034"/>
-            <a:ext cx="3511233" cy="1192071"/>
+            <a:ext cx="3603210" cy="1192071"/>
           </a:xfrm>
           <a:prstGeom prst="rect">
             <a:avLst/>
@@ -6767,7 +6718,7 @@
             <a:prstTxWarp prst="textNoShape">
               <a:avLst/>
             </a:prstTxWarp>
-            <a:normAutofit/>
+            <a:normAutofit fontScale="92500"/>
           </a:bodyPr>
           <a:lstStyle/>
           <a:p>
@@ -6788,15 +6739,1778 @@
                 <a:ea typeface="+mj-ea"/>
                 <a:cs typeface="+mj-cs"/>
               </a:rPr>
-              <a:t>Escopo</a:t>
+              <a:t>A IMPORTÂNCIA</a:t>
             </a:r>
           </a:p>
+          <a:p>
+            <a:pPr algn="ctr" defTabSz="457200">
+              <a:spcBef>
+                <a:spcPct val="0"/>
+              </a:spcBef>
+              <a:spcAft>
+                <a:spcPts val="600"/>
+              </a:spcAft>
+            </a:pPr>
+            <a:r>
+              <a:rPr lang="pt-BR" sz="3600" cap="all" dirty="0">
+                <a:solidFill>
+                  <a:srgbClr val="FFFFFF"/>
+                </a:solidFill>
+                <a:latin typeface="+mj-lt"/>
+                <a:ea typeface="+mj-ea"/>
+                <a:cs typeface="+mj-cs"/>
+              </a:rPr>
+              <a:t>Dos requisitos</a:t>
+            </a:r>
+          </a:p>
         </p:txBody>
       </p:sp>
+      <p:pic>
+        <p:nvPicPr>
+          <p:cNvPr id="3" name="Imagem 2">
+            <a:extLst>
+              <a:ext uri="{FF2B5EF4-FFF2-40B4-BE49-F238E27FC236}">
+                <a16:creationId xmlns:a16="http://schemas.microsoft.com/office/drawing/2014/main" id="{BD5B98D6-56E5-4341-90E7-8172FD31DF6B}"/>
+              </a:ext>
+            </a:extLst>
+          </p:cNvPr>
+          <p:cNvPicPr>
+            <a:picLocks noChangeAspect="1"/>
+          </p:cNvPicPr>
+          <p:nvPr/>
+        </p:nvPicPr>
+        <p:blipFill>
+          <a:blip r:embed="rId2"/>
+          <a:stretch>
+            <a:fillRect/>
+          </a:stretch>
+        </p:blipFill>
+        <p:spPr>
+          <a:xfrm>
+            <a:off x="5732632" y="1238209"/>
+            <a:ext cx="5549769" cy="4591050"/>
+          </a:xfrm>
+          <a:prstGeom prst="rect">
+            <a:avLst/>
+          </a:prstGeom>
+          <a:ln w="228600" cap="sq" cmpd="thickThin">
+            <a:solidFill>
+              <a:schemeClr val="accent2">
+                <a:lumMod val="75000"/>
+              </a:schemeClr>
+            </a:solidFill>
+            <a:prstDash val="solid"/>
+            <a:miter lim="800000"/>
+          </a:ln>
+          <a:effectLst>
+            <a:innerShdw blurRad="76200">
+              <a:srgbClr val="000000"/>
+            </a:innerShdw>
+          </a:effectLst>
+        </p:spPr>
+      </p:pic>
     </p:spTree>
     <p:extLst>
       <p:ext uri="{BB962C8B-B14F-4D97-AF65-F5344CB8AC3E}">
         <p14:creationId xmlns:p14="http://schemas.microsoft.com/office/powerpoint/2010/main" val="1002715679"/>
+      </p:ext>
+    </p:extLst>
+  </p:cSld>
+  <p:clrMapOvr>
+    <a:masterClrMapping/>
+  </p:clrMapOvr>
+</p:sld>
+</file>
+
+<file path=ppt/slides/slide7.xml><?xml version="1.0" encoding="utf-8"?>
+<p:sld xmlns:a="http://schemas.openxmlformats.org/drawingml/2006/main" xmlns:r="http://schemas.openxmlformats.org/officeDocument/2006/relationships" xmlns:p="http://schemas.openxmlformats.org/presentationml/2006/main">
+  <p:cSld>
+    <p:bg>
+      <p:bgPr>
+        <a:solidFill>
+          <a:schemeClr val="bg1"/>
+        </a:solidFill>
+        <a:effectLst/>
+      </p:bgPr>
+    </p:bg>
+    <p:spTree>
+      <p:nvGrpSpPr>
+        <p:cNvPr id="1" name=""/>
+        <p:cNvGrpSpPr/>
+        <p:nvPr/>
+      </p:nvGrpSpPr>
+      <p:grpSpPr>
+        <a:xfrm>
+          <a:off x="0" y="0"/>
+          <a:ext cx="0" cy="0"/>
+          <a:chOff x="0" y="0"/>
+          <a:chExt cx="0" cy="0"/>
+        </a:xfrm>
+      </p:grpSpPr>
+      <p:sp>
+        <p:nvSpPr>
+          <p:cNvPr id="46" name="Rectangle 45">
+            <a:extLst>
+              <a:ext uri="{FF2B5EF4-FFF2-40B4-BE49-F238E27FC236}">
+                <a16:creationId xmlns:a16="http://schemas.microsoft.com/office/drawing/2014/main" id="{2928117C-9446-4E7F-AE62-95E0F6DB5B27}"/>
+              </a:ext>
+              <a:ext uri="{C183D7F6-B498-43B3-948B-1728B52AA6E4}">
+                <adec:decorative xmlns:adec="http://schemas.microsoft.com/office/drawing/2017/decorative" val="1"/>
+              </a:ext>
+            </a:extLst>
+          </p:cNvPr>
+          <p:cNvSpPr>
+            <a:spLocks noGrp="1" noRot="1" noChangeAspect="1" noMove="1" noResize="1" noEditPoints="1" noAdjustHandles="1" noChangeArrowheads="1" noChangeShapeType="1" noTextEdit="1"/>
+          </p:cNvSpPr>
+          <p:nvPr>
+            <p:extLst>
+              <p:ext uri="{386F3935-93C4-4BCD-93E2-E3B085C9AB24}">
+                <p16:designElem xmlns:p16="http://schemas.microsoft.com/office/powerpoint/2015/main" val="1"/>
+              </p:ext>
+            </p:extLst>
+          </p:nvPr>
+        </p:nvSpPr>
+        <p:spPr>
+          <a:xfrm>
+            <a:off x="446534" y="457200"/>
+            <a:ext cx="3703320" cy="94997"/>
+          </a:xfrm>
+          <a:prstGeom prst="rect">
+            <a:avLst/>
+          </a:prstGeom>
+          <a:solidFill>
+            <a:schemeClr val="accent1"/>
+          </a:solidFill>
+          <a:ln>
+            <a:noFill/>
+          </a:ln>
+          <a:effectLst/>
+        </p:spPr>
+        <p:style>
+          <a:lnRef idx="1">
+            <a:schemeClr val="accent1"/>
+          </a:lnRef>
+          <a:fillRef idx="3">
+            <a:schemeClr val="accent1"/>
+          </a:fillRef>
+          <a:effectRef idx="2">
+            <a:schemeClr val="accent1"/>
+          </a:effectRef>
+          <a:fontRef idx="minor">
+            <a:schemeClr val="lt1"/>
+          </a:fontRef>
+        </p:style>
+      </p:sp>
+      <p:sp>
+        <p:nvSpPr>
+          <p:cNvPr id="48" name="Rectangle 47">
+            <a:extLst>
+              <a:ext uri="{FF2B5EF4-FFF2-40B4-BE49-F238E27FC236}">
+                <a16:creationId xmlns:a16="http://schemas.microsoft.com/office/drawing/2014/main" id="{84D30AFB-4D71-48B0-AA00-28EE92363A5F}"/>
+              </a:ext>
+              <a:ext uri="{C183D7F6-B498-43B3-948B-1728B52AA6E4}">
+                <adec:decorative xmlns:adec="http://schemas.microsoft.com/office/drawing/2017/decorative" val="1"/>
+              </a:ext>
+            </a:extLst>
+          </p:cNvPr>
+          <p:cNvSpPr>
+            <a:spLocks noGrp="1" noRot="1" noChangeAspect="1" noMove="1" noResize="1" noEditPoints="1" noAdjustHandles="1" noChangeArrowheads="1" noChangeShapeType="1" noTextEdit="1"/>
+          </p:cNvSpPr>
+          <p:nvPr>
+            <p:extLst>
+              <p:ext uri="{386F3935-93C4-4BCD-93E2-E3B085C9AB24}">
+                <p16:designElem xmlns:p16="http://schemas.microsoft.com/office/powerpoint/2015/main" val="1"/>
+              </p:ext>
+            </p:extLst>
+          </p:nvPr>
+        </p:nvSpPr>
+        <p:spPr>
+          <a:xfrm>
+            <a:off x="8042147" y="453643"/>
+            <a:ext cx="3703320" cy="98554"/>
+          </a:xfrm>
+          <a:prstGeom prst="rect">
+            <a:avLst/>
+          </a:prstGeom>
+          <a:solidFill>
+            <a:schemeClr val="accent4"/>
+          </a:solidFill>
+          <a:ln>
+            <a:noFill/>
+          </a:ln>
+          <a:effectLst/>
+        </p:spPr>
+        <p:style>
+          <a:lnRef idx="1">
+            <a:schemeClr val="accent1"/>
+          </a:lnRef>
+          <a:fillRef idx="3">
+            <a:schemeClr val="accent1"/>
+          </a:fillRef>
+          <a:effectRef idx="2">
+            <a:schemeClr val="accent1"/>
+          </a:effectRef>
+          <a:fontRef idx="minor">
+            <a:schemeClr val="lt1"/>
+          </a:fontRef>
+        </p:style>
+      </p:sp>
+      <p:sp>
+        <p:nvSpPr>
+          <p:cNvPr id="50" name="Rectangle 49">
+            <a:extLst>
+              <a:ext uri="{FF2B5EF4-FFF2-40B4-BE49-F238E27FC236}">
+                <a16:creationId xmlns:a16="http://schemas.microsoft.com/office/drawing/2014/main" id="{96A0B76F-8010-4C62-B4B6-C5FC438C059E}"/>
+              </a:ext>
+              <a:ext uri="{C183D7F6-B498-43B3-948B-1728B52AA6E4}">
+                <adec:decorative xmlns:adec="http://schemas.microsoft.com/office/drawing/2017/decorative" val="1"/>
+              </a:ext>
+            </a:extLst>
+          </p:cNvPr>
+          <p:cNvSpPr>
+            <a:spLocks noGrp="1" noRot="1" noChangeAspect="1" noMove="1" noResize="1" noEditPoints="1" noAdjustHandles="1" noChangeArrowheads="1" noChangeShapeType="1" noTextEdit="1"/>
+          </p:cNvSpPr>
+          <p:nvPr>
+            <p:extLst>
+              <p:ext uri="{386F3935-93C4-4BCD-93E2-E3B085C9AB24}">
+                <p16:designElem xmlns:p16="http://schemas.microsoft.com/office/powerpoint/2015/main" val="1"/>
+              </p:ext>
+            </p:extLst>
+          </p:nvPr>
+        </p:nvSpPr>
+        <p:spPr>
+          <a:xfrm>
+            <a:off x="4241830" y="457200"/>
+            <a:ext cx="3703320" cy="91440"/>
+          </a:xfrm>
+          <a:prstGeom prst="rect">
+            <a:avLst/>
+          </a:prstGeom>
+          <a:solidFill>
+            <a:schemeClr val="accent2"/>
+          </a:solidFill>
+          <a:ln>
+            <a:noFill/>
+          </a:ln>
+          <a:effectLst/>
+        </p:spPr>
+        <p:style>
+          <a:lnRef idx="1">
+            <a:schemeClr val="accent1"/>
+          </a:lnRef>
+          <a:fillRef idx="3">
+            <a:schemeClr val="accent1"/>
+          </a:fillRef>
+          <a:effectRef idx="2">
+            <a:schemeClr val="accent1"/>
+          </a:effectRef>
+          <a:fontRef idx="minor">
+            <a:schemeClr val="lt1"/>
+          </a:fontRef>
+        </p:style>
+      </p:sp>
+      <p:sp>
+        <p:nvSpPr>
+          <p:cNvPr id="52" name="Rectangle 51">
+            <a:extLst>
+              <a:ext uri="{FF2B5EF4-FFF2-40B4-BE49-F238E27FC236}">
+                <a16:creationId xmlns:a16="http://schemas.microsoft.com/office/drawing/2014/main" id="{9FC936C0-4624-438D-BDD0-6B296BD6409D}"/>
+              </a:ext>
+              <a:ext uri="{C183D7F6-B498-43B3-948B-1728B52AA6E4}">
+                <adec:decorative xmlns:adec="http://schemas.microsoft.com/office/drawing/2017/decorative" val="1"/>
+              </a:ext>
+            </a:extLst>
+          </p:cNvPr>
+          <p:cNvSpPr>
+            <a:spLocks noGrp="1" noRot="1" noChangeAspect="1" noMove="1" noResize="1" noEditPoints="1" noAdjustHandles="1" noChangeArrowheads="1" noChangeShapeType="1" noTextEdit="1"/>
+          </p:cNvSpPr>
+          <p:nvPr>
+            <p:extLst>
+              <p:ext uri="{386F3935-93C4-4BCD-93E2-E3B085C9AB24}">
+                <p16:designElem xmlns:p16="http://schemas.microsoft.com/office/powerpoint/2015/main" val="1"/>
+              </p:ext>
+            </p:extLst>
+          </p:nvPr>
+        </p:nvSpPr>
+        <p:spPr>
+          <a:xfrm>
+            <a:off x="446534" y="3085765"/>
+            <a:ext cx="11262866" cy="3304800"/>
+          </a:xfrm>
+          <a:prstGeom prst="rect">
+            <a:avLst/>
+          </a:prstGeom>
+          <a:solidFill>
+            <a:schemeClr val="accent1"/>
+          </a:solidFill>
+          <a:ln>
+            <a:noFill/>
+          </a:ln>
+          <a:effectLst/>
+        </p:spPr>
+        <p:style>
+          <a:lnRef idx="1">
+            <a:schemeClr val="accent1"/>
+          </a:lnRef>
+          <a:fillRef idx="3">
+            <a:schemeClr val="accent1"/>
+          </a:fillRef>
+          <a:effectRef idx="2">
+            <a:schemeClr val="accent1"/>
+          </a:effectRef>
+          <a:fontRef idx="minor">
+            <a:schemeClr val="lt1"/>
+          </a:fontRef>
+        </p:style>
+      </p:sp>
+      <p:sp>
+        <p:nvSpPr>
+          <p:cNvPr id="54" name="Rectangle 53">
+            <a:extLst>
+              <a:ext uri="{FF2B5EF4-FFF2-40B4-BE49-F238E27FC236}">
+                <a16:creationId xmlns:a16="http://schemas.microsoft.com/office/drawing/2014/main" id="{E08D4B6A-8113-4DFB-B82E-B60CAC8E0A50}"/>
+              </a:ext>
+              <a:ext uri="{C183D7F6-B498-43B3-948B-1728B52AA6E4}">
+                <adec:decorative xmlns:adec="http://schemas.microsoft.com/office/drawing/2017/decorative" val="1"/>
+              </a:ext>
+            </a:extLst>
+          </p:cNvPr>
+          <p:cNvSpPr>
+            <a:spLocks noGrp="1" noRot="1" noChangeAspect="1" noMove="1" noResize="1" noEditPoints="1" noAdjustHandles="1" noChangeArrowheads="1" noChangeShapeType="1" noTextEdit="1"/>
+          </p:cNvSpPr>
+          <p:nvPr>
+            <p:extLst>
+              <p:ext uri="{386F3935-93C4-4BCD-93E2-E3B085C9AB24}">
+                <p16:designElem xmlns:p16="http://schemas.microsoft.com/office/powerpoint/2015/main" val="1"/>
+              </p:ext>
+            </p:extLst>
+          </p:nvPr>
+        </p:nvSpPr>
+        <p:spPr>
+          <a:xfrm>
+            <a:off x="0" y="0"/>
+            <a:ext cx="12192000" cy="6858000"/>
+          </a:xfrm>
+          <a:prstGeom prst="rect">
+            <a:avLst/>
+          </a:prstGeom>
+          <a:solidFill>
+            <a:srgbClr val="FFFFFF"/>
+          </a:solidFill>
+          <a:ln>
+            <a:noFill/>
+          </a:ln>
+        </p:spPr>
+        <p:style>
+          <a:lnRef idx="2">
+            <a:schemeClr val="accent1">
+              <a:shade val="50000"/>
+            </a:schemeClr>
+          </a:lnRef>
+          <a:fillRef idx="1">
+            <a:schemeClr val="accent1"/>
+          </a:fillRef>
+          <a:effectRef idx="0">
+            <a:schemeClr val="accent1"/>
+          </a:effectRef>
+          <a:fontRef idx="minor">
+            <a:schemeClr val="lt1"/>
+          </a:fontRef>
+        </p:style>
+        <p:txBody>
+          <a:bodyPr rtlCol="0" anchor="ctr"/>
+          <a:lstStyle/>
+          <a:p>
+            <a:pPr marL="0" marR="0" lvl="0" indent="0" algn="ctr" defTabSz="457200" rtl="0" eaLnBrk="1" fontAlgn="auto" latinLnBrk="0" hangingPunct="1">
+              <a:lnSpc>
+                <a:spcPct val="100000"/>
+              </a:lnSpc>
+              <a:spcBef>
+                <a:spcPts val="0"/>
+              </a:spcBef>
+              <a:spcAft>
+                <a:spcPts val="0"/>
+              </a:spcAft>
+              <a:buClrTx/>
+              <a:buSzTx/>
+              <a:buFontTx/>
+              <a:buNone/>
+              <a:tabLst/>
+              <a:defRPr/>
+            </a:pPr>
+            <a:endParaRPr kumimoji="0" lang="en-US" sz="1800" b="0" i="0" u="none" strike="noStrike" kern="1200" cap="none" spc="0" normalizeH="0" baseline="0" noProof="0">
+              <a:ln>
+                <a:noFill/>
+              </a:ln>
+              <a:solidFill>
+                <a:prstClr val="white"/>
+              </a:solidFill>
+              <a:effectLst/>
+              <a:uLnTx/>
+              <a:uFillTx/>
+              <a:latin typeface="Gill Sans MT" panose="020B0502020104020203"/>
+              <a:ea typeface="+mn-ea"/>
+              <a:cs typeface="+mn-cs"/>
+            </a:endParaRPr>
+          </a:p>
+        </p:txBody>
+      </p:sp>
+      <p:sp>
+        <p:nvSpPr>
+          <p:cNvPr id="56" name="Rectangle 55">
+            <a:extLst>
+              <a:ext uri="{FF2B5EF4-FFF2-40B4-BE49-F238E27FC236}">
+                <a16:creationId xmlns:a16="http://schemas.microsoft.com/office/drawing/2014/main" id="{9822E561-F97C-4CBB-A9A6-A6BF6317BC84}"/>
+              </a:ext>
+              <a:ext uri="{C183D7F6-B498-43B3-948B-1728B52AA6E4}">
+                <adec:decorative xmlns:adec="http://schemas.microsoft.com/office/drawing/2017/decorative" val="1"/>
+              </a:ext>
+            </a:extLst>
+          </p:cNvPr>
+          <p:cNvSpPr>
+            <a:spLocks noGrp="1" noRot="1" noChangeAspect="1" noMove="1" noResize="1" noEditPoints="1" noAdjustHandles="1" noChangeArrowheads="1" noChangeShapeType="1" noTextEdit="1"/>
+          </p:cNvSpPr>
+          <p:nvPr>
+            <p:extLst>
+              <p:ext uri="{386F3935-93C4-4BCD-93E2-E3B085C9AB24}">
+                <p16:designElem xmlns:p16="http://schemas.microsoft.com/office/powerpoint/2015/main" val="1"/>
+              </p:ext>
+            </p:extLst>
+          </p:nvPr>
+        </p:nvSpPr>
+        <p:spPr>
+          <a:xfrm>
+            <a:off x="0" y="0"/>
+            <a:ext cx="12192000" cy="6858000"/>
+          </a:xfrm>
+          <a:prstGeom prst="rect">
+            <a:avLst/>
+          </a:prstGeom>
+          <a:solidFill>
+            <a:schemeClr val="accent1"/>
+          </a:solidFill>
+          <a:ln>
+            <a:noFill/>
+          </a:ln>
+          <a:effectLst/>
+        </p:spPr>
+        <p:style>
+          <a:lnRef idx="1">
+            <a:schemeClr val="accent1"/>
+          </a:lnRef>
+          <a:fillRef idx="3">
+            <a:schemeClr val="accent1"/>
+          </a:fillRef>
+          <a:effectRef idx="2">
+            <a:schemeClr val="accent1"/>
+          </a:effectRef>
+          <a:fontRef idx="minor">
+            <a:schemeClr val="lt1"/>
+          </a:fontRef>
+        </p:style>
+      </p:sp>
+      <p:sp>
+        <p:nvSpPr>
+          <p:cNvPr id="58" name="Rectangle 57">
+            <a:extLst>
+              <a:ext uri="{FF2B5EF4-FFF2-40B4-BE49-F238E27FC236}">
+                <a16:creationId xmlns:a16="http://schemas.microsoft.com/office/drawing/2014/main" id="{B01B0E58-A5C8-4CDA-A2E0-35DF94E59857}"/>
+              </a:ext>
+              <a:ext uri="{C183D7F6-B498-43B3-948B-1728B52AA6E4}">
+                <adec:decorative xmlns:adec="http://schemas.microsoft.com/office/drawing/2017/decorative" val="1"/>
+              </a:ext>
+            </a:extLst>
+          </p:cNvPr>
+          <p:cNvSpPr>
+            <a:spLocks noGrp="1" noRot="1" noChangeAspect="1" noMove="1" noResize="1" noEditPoints="1" noAdjustHandles="1" noChangeArrowheads="1" noChangeShapeType="1" noTextEdit="1"/>
+          </p:cNvSpPr>
+          <p:nvPr>
+            <p:extLst>
+              <p:ext uri="{386F3935-93C4-4BCD-93E2-E3B085C9AB24}">
+                <p16:designElem xmlns:p16="http://schemas.microsoft.com/office/powerpoint/2015/main" val="1"/>
+              </p:ext>
+            </p:extLst>
+          </p:nvPr>
+        </p:nvSpPr>
+        <p:spPr>
+          <a:xfrm>
+            <a:off x="638620" y="457200"/>
+            <a:ext cx="3511233" cy="91439"/>
+          </a:xfrm>
+          <a:prstGeom prst="rect">
+            <a:avLst/>
+          </a:prstGeom>
+          <a:solidFill>
+            <a:schemeClr val="accent2"/>
+          </a:solidFill>
+          <a:ln>
+            <a:noFill/>
+          </a:ln>
+          <a:effectLst/>
+        </p:spPr>
+        <p:style>
+          <a:lnRef idx="1">
+            <a:schemeClr val="accent1"/>
+          </a:lnRef>
+          <a:fillRef idx="3">
+            <a:schemeClr val="accent1"/>
+          </a:fillRef>
+          <a:effectRef idx="2">
+            <a:schemeClr val="accent1"/>
+          </a:effectRef>
+          <a:fontRef idx="minor">
+            <a:schemeClr val="lt1"/>
+          </a:fontRef>
+        </p:style>
+      </p:sp>
+      <p:sp>
+        <p:nvSpPr>
+          <p:cNvPr id="13" name="TextBox 7">
+            <a:extLst>
+              <a:ext uri="{FF2B5EF4-FFF2-40B4-BE49-F238E27FC236}">
+                <a16:creationId xmlns:a16="http://schemas.microsoft.com/office/drawing/2014/main" id="{AE982F09-096F-4E31-9F65-2032E3CCFDC9}"/>
+              </a:ext>
+            </a:extLst>
+          </p:cNvPr>
+          <p:cNvSpPr txBox="1"/>
+          <p:nvPr/>
+        </p:nvSpPr>
+        <p:spPr>
+          <a:xfrm>
+            <a:off x="638620" y="2934034"/>
+            <a:ext cx="3603210" cy="1192071"/>
+          </a:xfrm>
+          <a:prstGeom prst="rect">
+            <a:avLst/>
+          </a:prstGeom>
+        </p:spPr>
+        <p:txBody>
+          <a:bodyPr rot="0" spcFirstLastPara="0" vertOverflow="overflow" horzOverflow="overflow" vert="horz" lIns="91440" tIns="45720" rIns="91440" bIns="45720" numCol="1" spcCol="0" rtlCol="0" fromWordArt="0" anchor="ctr" anchorCtr="0" forceAA="0" compatLnSpc="1">
+            <a:prstTxWarp prst="textNoShape">
+              <a:avLst/>
+            </a:prstTxWarp>
+            <a:normAutofit fontScale="92500"/>
+          </a:bodyPr>
+          <a:lstStyle/>
+          <a:p>
+            <a:pPr algn="ctr" defTabSz="457200">
+              <a:spcBef>
+                <a:spcPct val="0"/>
+              </a:spcBef>
+              <a:spcAft>
+                <a:spcPts val="600"/>
+              </a:spcAft>
+            </a:pPr>
+            <a:r>
+              <a:rPr lang="pt-BR" sz="3600" cap="all" dirty="0">
+                <a:solidFill>
+                  <a:srgbClr val="FFFFFF"/>
+                </a:solidFill>
+                <a:latin typeface="+mj-lt"/>
+                <a:ea typeface="+mj-ea"/>
+                <a:cs typeface="+mj-cs"/>
+              </a:rPr>
+              <a:t>A IMPORTÂNCIA</a:t>
+            </a:r>
+          </a:p>
+          <a:p>
+            <a:pPr algn="ctr" defTabSz="457200">
+              <a:spcBef>
+                <a:spcPct val="0"/>
+              </a:spcBef>
+              <a:spcAft>
+                <a:spcPts val="600"/>
+              </a:spcAft>
+            </a:pPr>
+            <a:r>
+              <a:rPr lang="pt-BR" sz="3600" cap="all" dirty="0">
+                <a:solidFill>
+                  <a:srgbClr val="FFFFFF"/>
+                </a:solidFill>
+                <a:latin typeface="+mj-lt"/>
+                <a:ea typeface="+mj-ea"/>
+                <a:cs typeface="+mj-cs"/>
+              </a:rPr>
+              <a:t>Dos requisitos</a:t>
+            </a:r>
+          </a:p>
+        </p:txBody>
+      </p:sp>
+      <p:pic>
+        <p:nvPicPr>
+          <p:cNvPr id="3" name="Imagem 2">
+            <a:extLst>
+              <a:ext uri="{FF2B5EF4-FFF2-40B4-BE49-F238E27FC236}">
+                <a16:creationId xmlns:a16="http://schemas.microsoft.com/office/drawing/2014/main" id="{999A5297-4C40-4312-857C-DFF381F86650}"/>
+              </a:ext>
+            </a:extLst>
+          </p:cNvPr>
+          <p:cNvPicPr>
+            <a:picLocks noChangeAspect="1"/>
+          </p:cNvPicPr>
+          <p:nvPr/>
+        </p:nvPicPr>
+        <p:blipFill>
+          <a:blip r:embed="rId2"/>
+          <a:stretch>
+            <a:fillRect/>
+          </a:stretch>
+        </p:blipFill>
+        <p:spPr>
+          <a:xfrm>
+            <a:off x="5149110" y="1560387"/>
+            <a:ext cx="6258622" cy="4148035"/>
+          </a:xfrm>
+          <a:prstGeom prst="rect">
+            <a:avLst/>
+          </a:prstGeom>
+          <a:ln w="228600" cap="sq" cmpd="thickThin">
+            <a:solidFill>
+              <a:schemeClr val="accent2">
+                <a:lumMod val="75000"/>
+              </a:schemeClr>
+            </a:solidFill>
+            <a:prstDash val="solid"/>
+            <a:miter lim="800000"/>
+          </a:ln>
+          <a:effectLst>
+            <a:innerShdw blurRad="76200">
+              <a:srgbClr val="000000"/>
+            </a:innerShdw>
+          </a:effectLst>
+        </p:spPr>
+      </p:pic>
+    </p:spTree>
+    <p:extLst>
+      <p:ext uri="{BB962C8B-B14F-4D97-AF65-F5344CB8AC3E}">
+        <p14:creationId xmlns:p14="http://schemas.microsoft.com/office/powerpoint/2010/main" val="4039183220"/>
+      </p:ext>
+    </p:extLst>
+  </p:cSld>
+  <p:clrMapOvr>
+    <a:masterClrMapping/>
+  </p:clrMapOvr>
+</p:sld>
+</file>
+
+<file path=ppt/slides/slide8.xml><?xml version="1.0" encoding="utf-8"?>
+<p:sld xmlns:a="http://schemas.openxmlformats.org/drawingml/2006/main" xmlns:r="http://schemas.openxmlformats.org/officeDocument/2006/relationships" xmlns:p="http://schemas.openxmlformats.org/presentationml/2006/main">
+  <p:cSld>
+    <p:bg>
+      <p:bgPr>
+        <a:solidFill>
+          <a:schemeClr val="bg1"/>
+        </a:solidFill>
+        <a:effectLst/>
+      </p:bgPr>
+    </p:bg>
+    <p:spTree>
+      <p:nvGrpSpPr>
+        <p:cNvPr id="1" name=""/>
+        <p:cNvGrpSpPr/>
+        <p:nvPr/>
+      </p:nvGrpSpPr>
+      <p:grpSpPr>
+        <a:xfrm>
+          <a:off x="0" y="0"/>
+          <a:ext cx="0" cy="0"/>
+          <a:chOff x="0" y="0"/>
+          <a:chExt cx="0" cy="0"/>
+        </a:xfrm>
+      </p:grpSpPr>
+      <p:sp>
+        <p:nvSpPr>
+          <p:cNvPr id="46" name="Rectangle 45">
+            <a:extLst>
+              <a:ext uri="{FF2B5EF4-FFF2-40B4-BE49-F238E27FC236}">
+                <a16:creationId xmlns:a16="http://schemas.microsoft.com/office/drawing/2014/main" id="{2928117C-9446-4E7F-AE62-95E0F6DB5B27}"/>
+              </a:ext>
+              <a:ext uri="{C183D7F6-B498-43B3-948B-1728B52AA6E4}">
+                <adec:decorative xmlns:adec="http://schemas.microsoft.com/office/drawing/2017/decorative" val="1"/>
+              </a:ext>
+            </a:extLst>
+          </p:cNvPr>
+          <p:cNvSpPr>
+            <a:spLocks noGrp="1" noRot="1" noChangeAspect="1" noMove="1" noResize="1" noEditPoints="1" noAdjustHandles="1" noChangeArrowheads="1" noChangeShapeType="1" noTextEdit="1"/>
+          </p:cNvSpPr>
+          <p:nvPr>
+            <p:extLst>
+              <p:ext uri="{386F3935-93C4-4BCD-93E2-E3B085C9AB24}">
+                <p16:designElem xmlns:p16="http://schemas.microsoft.com/office/powerpoint/2015/main" val="1"/>
+              </p:ext>
+            </p:extLst>
+          </p:nvPr>
+        </p:nvSpPr>
+        <p:spPr>
+          <a:xfrm>
+            <a:off x="446534" y="457200"/>
+            <a:ext cx="3703320" cy="94997"/>
+          </a:xfrm>
+          <a:prstGeom prst="rect">
+            <a:avLst/>
+          </a:prstGeom>
+          <a:solidFill>
+            <a:schemeClr val="accent1"/>
+          </a:solidFill>
+          <a:ln>
+            <a:noFill/>
+          </a:ln>
+          <a:effectLst/>
+        </p:spPr>
+        <p:style>
+          <a:lnRef idx="1">
+            <a:schemeClr val="accent1"/>
+          </a:lnRef>
+          <a:fillRef idx="3">
+            <a:schemeClr val="accent1"/>
+          </a:fillRef>
+          <a:effectRef idx="2">
+            <a:schemeClr val="accent1"/>
+          </a:effectRef>
+          <a:fontRef idx="minor">
+            <a:schemeClr val="lt1"/>
+          </a:fontRef>
+        </p:style>
+      </p:sp>
+      <p:sp>
+        <p:nvSpPr>
+          <p:cNvPr id="48" name="Rectangle 47">
+            <a:extLst>
+              <a:ext uri="{FF2B5EF4-FFF2-40B4-BE49-F238E27FC236}">
+                <a16:creationId xmlns:a16="http://schemas.microsoft.com/office/drawing/2014/main" id="{84D30AFB-4D71-48B0-AA00-28EE92363A5F}"/>
+              </a:ext>
+              <a:ext uri="{C183D7F6-B498-43B3-948B-1728B52AA6E4}">
+                <adec:decorative xmlns:adec="http://schemas.microsoft.com/office/drawing/2017/decorative" val="1"/>
+              </a:ext>
+            </a:extLst>
+          </p:cNvPr>
+          <p:cNvSpPr>
+            <a:spLocks noGrp="1" noRot="1" noChangeAspect="1" noMove="1" noResize="1" noEditPoints="1" noAdjustHandles="1" noChangeArrowheads="1" noChangeShapeType="1" noTextEdit="1"/>
+          </p:cNvSpPr>
+          <p:nvPr>
+            <p:extLst>
+              <p:ext uri="{386F3935-93C4-4BCD-93E2-E3B085C9AB24}">
+                <p16:designElem xmlns:p16="http://schemas.microsoft.com/office/powerpoint/2015/main" val="1"/>
+              </p:ext>
+            </p:extLst>
+          </p:nvPr>
+        </p:nvSpPr>
+        <p:spPr>
+          <a:xfrm>
+            <a:off x="8042147" y="453643"/>
+            <a:ext cx="3703320" cy="98554"/>
+          </a:xfrm>
+          <a:prstGeom prst="rect">
+            <a:avLst/>
+          </a:prstGeom>
+          <a:solidFill>
+            <a:schemeClr val="accent4"/>
+          </a:solidFill>
+          <a:ln>
+            <a:noFill/>
+          </a:ln>
+          <a:effectLst/>
+        </p:spPr>
+        <p:style>
+          <a:lnRef idx="1">
+            <a:schemeClr val="accent1"/>
+          </a:lnRef>
+          <a:fillRef idx="3">
+            <a:schemeClr val="accent1"/>
+          </a:fillRef>
+          <a:effectRef idx="2">
+            <a:schemeClr val="accent1"/>
+          </a:effectRef>
+          <a:fontRef idx="minor">
+            <a:schemeClr val="lt1"/>
+          </a:fontRef>
+        </p:style>
+      </p:sp>
+      <p:sp>
+        <p:nvSpPr>
+          <p:cNvPr id="50" name="Rectangle 49">
+            <a:extLst>
+              <a:ext uri="{FF2B5EF4-FFF2-40B4-BE49-F238E27FC236}">
+                <a16:creationId xmlns:a16="http://schemas.microsoft.com/office/drawing/2014/main" id="{96A0B76F-8010-4C62-B4B6-C5FC438C059E}"/>
+              </a:ext>
+              <a:ext uri="{C183D7F6-B498-43B3-948B-1728B52AA6E4}">
+                <adec:decorative xmlns:adec="http://schemas.microsoft.com/office/drawing/2017/decorative" val="1"/>
+              </a:ext>
+            </a:extLst>
+          </p:cNvPr>
+          <p:cNvSpPr>
+            <a:spLocks noGrp="1" noRot="1" noChangeAspect="1" noMove="1" noResize="1" noEditPoints="1" noAdjustHandles="1" noChangeArrowheads="1" noChangeShapeType="1" noTextEdit="1"/>
+          </p:cNvSpPr>
+          <p:nvPr>
+            <p:extLst>
+              <p:ext uri="{386F3935-93C4-4BCD-93E2-E3B085C9AB24}">
+                <p16:designElem xmlns:p16="http://schemas.microsoft.com/office/powerpoint/2015/main" val="1"/>
+              </p:ext>
+            </p:extLst>
+          </p:nvPr>
+        </p:nvSpPr>
+        <p:spPr>
+          <a:xfrm>
+            <a:off x="4241830" y="457200"/>
+            <a:ext cx="3703320" cy="91440"/>
+          </a:xfrm>
+          <a:prstGeom prst="rect">
+            <a:avLst/>
+          </a:prstGeom>
+          <a:solidFill>
+            <a:schemeClr val="accent2"/>
+          </a:solidFill>
+          <a:ln>
+            <a:noFill/>
+          </a:ln>
+          <a:effectLst/>
+        </p:spPr>
+        <p:style>
+          <a:lnRef idx="1">
+            <a:schemeClr val="accent1"/>
+          </a:lnRef>
+          <a:fillRef idx="3">
+            <a:schemeClr val="accent1"/>
+          </a:fillRef>
+          <a:effectRef idx="2">
+            <a:schemeClr val="accent1"/>
+          </a:effectRef>
+          <a:fontRef idx="minor">
+            <a:schemeClr val="lt1"/>
+          </a:fontRef>
+        </p:style>
+      </p:sp>
+      <p:sp>
+        <p:nvSpPr>
+          <p:cNvPr id="52" name="Rectangle 51">
+            <a:extLst>
+              <a:ext uri="{FF2B5EF4-FFF2-40B4-BE49-F238E27FC236}">
+                <a16:creationId xmlns:a16="http://schemas.microsoft.com/office/drawing/2014/main" id="{9FC936C0-4624-438D-BDD0-6B296BD6409D}"/>
+              </a:ext>
+              <a:ext uri="{C183D7F6-B498-43B3-948B-1728B52AA6E4}">
+                <adec:decorative xmlns:adec="http://schemas.microsoft.com/office/drawing/2017/decorative" val="1"/>
+              </a:ext>
+            </a:extLst>
+          </p:cNvPr>
+          <p:cNvSpPr>
+            <a:spLocks noGrp="1" noRot="1" noChangeAspect="1" noMove="1" noResize="1" noEditPoints="1" noAdjustHandles="1" noChangeArrowheads="1" noChangeShapeType="1" noTextEdit="1"/>
+          </p:cNvSpPr>
+          <p:nvPr>
+            <p:extLst>
+              <p:ext uri="{386F3935-93C4-4BCD-93E2-E3B085C9AB24}">
+                <p16:designElem xmlns:p16="http://schemas.microsoft.com/office/powerpoint/2015/main" val="1"/>
+              </p:ext>
+            </p:extLst>
+          </p:nvPr>
+        </p:nvSpPr>
+        <p:spPr>
+          <a:xfrm>
+            <a:off x="446534" y="3085765"/>
+            <a:ext cx="11262866" cy="3304800"/>
+          </a:xfrm>
+          <a:prstGeom prst="rect">
+            <a:avLst/>
+          </a:prstGeom>
+          <a:solidFill>
+            <a:schemeClr val="accent1"/>
+          </a:solidFill>
+          <a:ln>
+            <a:noFill/>
+          </a:ln>
+          <a:effectLst/>
+        </p:spPr>
+        <p:style>
+          <a:lnRef idx="1">
+            <a:schemeClr val="accent1"/>
+          </a:lnRef>
+          <a:fillRef idx="3">
+            <a:schemeClr val="accent1"/>
+          </a:fillRef>
+          <a:effectRef idx="2">
+            <a:schemeClr val="accent1"/>
+          </a:effectRef>
+          <a:fontRef idx="minor">
+            <a:schemeClr val="lt1"/>
+          </a:fontRef>
+        </p:style>
+      </p:sp>
+      <p:sp>
+        <p:nvSpPr>
+          <p:cNvPr id="54" name="Rectangle 53">
+            <a:extLst>
+              <a:ext uri="{FF2B5EF4-FFF2-40B4-BE49-F238E27FC236}">
+                <a16:creationId xmlns:a16="http://schemas.microsoft.com/office/drawing/2014/main" id="{E08D4B6A-8113-4DFB-B82E-B60CAC8E0A50}"/>
+              </a:ext>
+              <a:ext uri="{C183D7F6-B498-43B3-948B-1728B52AA6E4}">
+                <adec:decorative xmlns:adec="http://schemas.microsoft.com/office/drawing/2017/decorative" val="1"/>
+              </a:ext>
+            </a:extLst>
+          </p:cNvPr>
+          <p:cNvSpPr>
+            <a:spLocks noGrp="1" noRot="1" noChangeAspect="1" noMove="1" noResize="1" noEditPoints="1" noAdjustHandles="1" noChangeArrowheads="1" noChangeShapeType="1" noTextEdit="1"/>
+          </p:cNvSpPr>
+          <p:nvPr>
+            <p:extLst>
+              <p:ext uri="{386F3935-93C4-4BCD-93E2-E3B085C9AB24}">
+                <p16:designElem xmlns:p16="http://schemas.microsoft.com/office/powerpoint/2015/main" val="1"/>
+              </p:ext>
+            </p:extLst>
+          </p:nvPr>
+        </p:nvSpPr>
+        <p:spPr>
+          <a:xfrm>
+            <a:off x="0" y="0"/>
+            <a:ext cx="12192000" cy="6858000"/>
+          </a:xfrm>
+          <a:prstGeom prst="rect">
+            <a:avLst/>
+          </a:prstGeom>
+          <a:solidFill>
+            <a:srgbClr val="FFFFFF"/>
+          </a:solidFill>
+          <a:ln>
+            <a:noFill/>
+          </a:ln>
+        </p:spPr>
+        <p:style>
+          <a:lnRef idx="2">
+            <a:schemeClr val="accent1">
+              <a:shade val="50000"/>
+            </a:schemeClr>
+          </a:lnRef>
+          <a:fillRef idx="1">
+            <a:schemeClr val="accent1"/>
+          </a:fillRef>
+          <a:effectRef idx="0">
+            <a:schemeClr val="accent1"/>
+          </a:effectRef>
+          <a:fontRef idx="minor">
+            <a:schemeClr val="lt1"/>
+          </a:fontRef>
+        </p:style>
+        <p:txBody>
+          <a:bodyPr rtlCol="0" anchor="ctr"/>
+          <a:lstStyle/>
+          <a:p>
+            <a:pPr marL="0" marR="0" lvl="0" indent="0" algn="ctr" defTabSz="457200" rtl="0" eaLnBrk="1" fontAlgn="auto" latinLnBrk="0" hangingPunct="1">
+              <a:lnSpc>
+                <a:spcPct val="100000"/>
+              </a:lnSpc>
+              <a:spcBef>
+                <a:spcPts val="0"/>
+              </a:spcBef>
+              <a:spcAft>
+                <a:spcPts val="0"/>
+              </a:spcAft>
+              <a:buClrTx/>
+              <a:buSzTx/>
+              <a:buFontTx/>
+              <a:buNone/>
+              <a:tabLst/>
+              <a:defRPr/>
+            </a:pPr>
+            <a:endParaRPr kumimoji="0" lang="en-US" sz="1800" b="0" i="0" u="none" strike="noStrike" kern="1200" cap="none" spc="0" normalizeH="0" baseline="0" noProof="0">
+              <a:ln>
+                <a:noFill/>
+              </a:ln>
+              <a:solidFill>
+                <a:prstClr val="white"/>
+              </a:solidFill>
+              <a:effectLst/>
+              <a:uLnTx/>
+              <a:uFillTx/>
+              <a:latin typeface="Gill Sans MT" panose="020B0502020104020203"/>
+              <a:ea typeface="+mn-ea"/>
+              <a:cs typeface="+mn-cs"/>
+            </a:endParaRPr>
+          </a:p>
+        </p:txBody>
+      </p:sp>
+      <p:sp>
+        <p:nvSpPr>
+          <p:cNvPr id="56" name="Rectangle 55">
+            <a:extLst>
+              <a:ext uri="{FF2B5EF4-FFF2-40B4-BE49-F238E27FC236}">
+                <a16:creationId xmlns:a16="http://schemas.microsoft.com/office/drawing/2014/main" id="{9822E561-F97C-4CBB-A9A6-A6BF6317BC84}"/>
+              </a:ext>
+              <a:ext uri="{C183D7F6-B498-43B3-948B-1728B52AA6E4}">
+                <adec:decorative xmlns:adec="http://schemas.microsoft.com/office/drawing/2017/decorative" val="1"/>
+              </a:ext>
+            </a:extLst>
+          </p:cNvPr>
+          <p:cNvSpPr>
+            <a:spLocks noGrp="1" noRot="1" noChangeAspect="1" noMove="1" noResize="1" noEditPoints="1" noAdjustHandles="1" noChangeArrowheads="1" noChangeShapeType="1" noTextEdit="1"/>
+          </p:cNvSpPr>
+          <p:nvPr>
+            <p:extLst>
+              <p:ext uri="{386F3935-93C4-4BCD-93E2-E3B085C9AB24}">
+                <p16:designElem xmlns:p16="http://schemas.microsoft.com/office/powerpoint/2015/main" val="1"/>
+              </p:ext>
+            </p:extLst>
+          </p:nvPr>
+        </p:nvSpPr>
+        <p:spPr>
+          <a:xfrm>
+            <a:off x="0" y="0"/>
+            <a:ext cx="12192000" cy="6858000"/>
+          </a:xfrm>
+          <a:prstGeom prst="rect">
+            <a:avLst/>
+          </a:prstGeom>
+          <a:solidFill>
+            <a:schemeClr val="accent1"/>
+          </a:solidFill>
+          <a:ln>
+            <a:noFill/>
+          </a:ln>
+          <a:effectLst/>
+        </p:spPr>
+        <p:style>
+          <a:lnRef idx="1">
+            <a:schemeClr val="accent1"/>
+          </a:lnRef>
+          <a:fillRef idx="3">
+            <a:schemeClr val="accent1"/>
+          </a:fillRef>
+          <a:effectRef idx="2">
+            <a:schemeClr val="accent1"/>
+          </a:effectRef>
+          <a:fontRef idx="minor">
+            <a:schemeClr val="lt1"/>
+          </a:fontRef>
+        </p:style>
+      </p:sp>
+      <p:sp>
+        <p:nvSpPr>
+          <p:cNvPr id="58" name="Rectangle 57">
+            <a:extLst>
+              <a:ext uri="{FF2B5EF4-FFF2-40B4-BE49-F238E27FC236}">
+                <a16:creationId xmlns:a16="http://schemas.microsoft.com/office/drawing/2014/main" id="{B01B0E58-A5C8-4CDA-A2E0-35DF94E59857}"/>
+              </a:ext>
+              <a:ext uri="{C183D7F6-B498-43B3-948B-1728B52AA6E4}">
+                <adec:decorative xmlns:adec="http://schemas.microsoft.com/office/drawing/2017/decorative" val="1"/>
+              </a:ext>
+            </a:extLst>
+          </p:cNvPr>
+          <p:cNvSpPr>
+            <a:spLocks noGrp="1" noRot="1" noChangeAspect="1" noMove="1" noResize="1" noEditPoints="1" noAdjustHandles="1" noChangeArrowheads="1" noChangeShapeType="1" noTextEdit="1"/>
+          </p:cNvSpPr>
+          <p:nvPr>
+            <p:extLst>
+              <p:ext uri="{386F3935-93C4-4BCD-93E2-E3B085C9AB24}">
+                <p16:designElem xmlns:p16="http://schemas.microsoft.com/office/powerpoint/2015/main" val="1"/>
+              </p:ext>
+            </p:extLst>
+          </p:nvPr>
+        </p:nvSpPr>
+        <p:spPr>
+          <a:xfrm>
+            <a:off x="638620" y="457200"/>
+            <a:ext cx="3511233" cy="91439"/>
+          </a:xfrm>
+          <a:prstGeom prst="rect">
+            <a:avLst/>
+          </a:prstGeom>
+          <a:solidFill>
+            <a:schemeClr val="accent2"/>
+          </a:solidFill>
+          <a:ln>
+            <a:noFill/>
+          </a:ln>
+          <a:effectLst/>
+        </p:spPr>
+        <p:style>
+          <a:lnRef idx="1">
+            <a:schemeClr val="accent1"/>
+          </a:lnRef>
+          <a:fillRef idx="3">
+            <a:schemeClr val="accent1"/>
+          </a:fillRef>
+          <a:effectRef idx="2">
+            <a:schemeClr val="accent1"/>
+          </a:effectRef>
+          <a:fontRef idx="minor">
+            <a:schemeClr val="lt1"/>
+          </a:fontRef>
+        </p:style>
+      </p:sp>
+      <p:sp>
+        <p:nvSpPr>
+          <p:cNvPr id="13" name="TextBox 7">
+            <a:extLst>
+              <a:ext uri="{FF2B5EF4-FFF2-40B4-BE49-F238E27FC236}">
+                <a16:creationId xmlns:a16="http://schemas.microsoft.com/office/drawing/2014/main" id="{AE982F09-096F-4E31-9F65-2032E3CCFDC9}"/>
+              </a:ext>
+            </a:extLst>
+          </p:cNvPr>
+          <p:cNvSpPr txBox="1"/>
+          <p:nvPr/>
+        </p:nvSpPr>
+        <p:spPr>
+          <a:xfrm>
+            <a:off x="638620" y="2934034"/>
+            <a:ext cx="3603210" cy="1192071"/>
+          </a:xfrm>
+          <a:prstGeom prst="rect">
+            <a:avLst/>
+          </a:prstGeom>
+        </p:spPr>
+        <p:txBody>
+          <a:bodyPr rot="0" spcFirstLastPara="0" vertOverflow="overflow" horzOverflow="overflow" vert="horz" lIns="91440" tIns="45720" rIns="91440" bIns="45720" numCol="1" spcCol="0" rtlCol="0" fromWordArt="0" anchor="ctr" anchorCtr="0" forceAA="0" compatLnSpc="1">
+            <a:prstTxWarp prst="textNoShape">
+              <a:avLst/>
+            </a:prstTxWarp>
+            <a:normAutofit fontScale="62500" lnSpcReduction="20000"/>
+          </a:bodyPr>
+          <a:lstStyle/>
+          <a:p>
+            <a:pPr algn="ctr" defTabSz="457200">
+              <a:spcBef>
+                <a:spcPct val="0"/>
+              </a:spcBef>
+              <a:spcAft>
+                <a:spcPts val="600"/>
+              </a:spcAft>
+            </a:pPr>
+            <a:r>
+              <a:rPr lang="pt-BR" sz="3600" cap="all" dirty="0">
+                <a:solidFill>
+                  <a:srgbClr val="FFFFFF"/>
+                </a:solidFill>
+                <a:latin typeface="+mj-lt"/>
+                <a:ea typeface="+mj-ea"/>
+                <a:cs typeface="+mj-cs"/>
+              </a:rPr>
+              <a:t>Requisitos funcionais e requisitos não funcionais</a:t>
+            </a:r>
+          </a:p>
+        </p:txBody>
+      </p:sp>
+      <p:pic>
+        <p:nvPicPr>
+          <p:cNvPr id="3" name="Imagem 2">
+            <a:extLst>
+              <a:ext uri="{FF2B5EF4-FFF2-40B4-BE49-F238E27FC236}">
+                <a16:creationId xmlns:a16="http://schemas.microsoft.com/office/drawing/2014/main" id="{33933CA5-0014-4AE6-97C6-8EA1A9CF5CEB}"/>
+              </a:ext>
+            </a:extLst>
+          </p:cNvPr>
+          <p:cNvPicPr>
+            <a:picLocks noChangeAspect="1"/>
+          </p:cNvPicPr>
+          <p:nvPr/>
+        </p:nvPicPr>
+        <p:blipFill>
+          <a:blip r:embed="rId2"/>
+          <a:stretch>
+            <a:fillRect/>
+          </a:stretch>
+        </p:blipFill>
+        <p:spPr>
+          <a:xfrm>
+            <a:off x="4662511" y="1185234"/>
+            <a:ext cx="7041421" cy="4689669"/>
+          </a:xfrm>
+          <a:prstGeom prst="rect">
+            <a:avLst/>
+          </a:prstGeom>
+          <a:ln w="228600" cap="sq" cmpd="thickThin">
+            <a:solidFill>
+              <a:schemeClr val="accent2">
+                <a:lumMod val="75000"/>
+              </a:schemeClr>
+            </a:solidFill>
+            <a:prstDash val="solid"/>
+            <a:miter lim="800000"/>
+          </a:ln>
+          <a:effectLst>
+            <a:innerShdw blurRad="76200">
+              <a:srgbClr val="000000"/>
+            </a:innerShdw>
+          </a:effectLst>
+        </p:spPr>
+      </p:pic>
+    </p:spTree>
+    <p:extLst>
+      <p:ext uri="{BB962C8B-B14F-4D97-AF65-F5344CB8AC3E}">
+        <p14:creationId xmlns:p14="http://schemas.microsoft.com/office/powerpoint/2010/main" val="2415683013"/>
+      </p:ext>
+    </p:extLst>
+  </p:cSld>
+  <p:clrMapOvr>
+    <a:masterClrMapping/>
+  </p:clrMapOvr>
+</p:sld>
+</file>
+
+<file path=ppt/slides/slide9.xml><?xml version="1.0" encoding="utf-8"?>
+<p:sld xmlns:a="http://schemas.openxmlformats.org/drawingml/2006/main" xmlns:r="http://schemas.openxmlformats.org/officeDocument/2006/relationships" xmlns:p="http://schemas.openxmlformats.org/presentationml/2006/main">
+  <p:cSld>
+    <p:bg>
+      <p:bgPr>
+        <a:solidFill>
+          <a:schemeClr val="bg1"/>
+        </a:solidFill>
+        <a:effectLst/>
+      </p:bgPr>
+    </p:bg>
+    <p:spTree>
+      <p:nvGrpSpPr>
+        <p:cNvPr id="1" name=""/>
+        <p:cNvGrpSpPr/>
+        <p:nvPr/>
+      </p:nvGrpSpPr>
+      <p:grpSpPr>
+        <a:xfrm>
+          <a:off x="0" y="0"/>
+          <a:ext cx="0" cy="0"/>
+          <a:chOff x="0" y="0"/>
+          <a:chExt cx="0" cy="0"/>
+        </a:xfrm>
+      </p:grpSpPr>
+      <p:sp>
+        <p:nvSpPr>
+          <p:cNvPr id="46" name="Rectangle 45">
+            <a:extLst>
+              <a:ext uri="{FF2B5EF4-FFF2-40B4-BE49-F238E27FC236}">
+                <a16:creationId xmlns:a16="http://schemas.microsoft.com/office/drawing/2014/main" id="{2928117C-9446-4E7F-AE62-95E0F6DB5B27}"/>
+              </a:ext>
+              <a:ext uri="{C183D7F6-B498-43B3-948B-1728B52AA6E4}">
+                <adec:decorative xmlns:adec="http://schemas.microsoft.com/office/drawing/2017/decorative" val="1"/>
+              </a:ext>
+            </a:extLst>
+          </p:cNvPr>
+          <p:cNvSpPr>
+            <a:spLocks noGrp="1" noRot="1" noChangeAspect="1" noMove="1" noResize="1" noEditPoints="1" noAdjustHandles="1" noChangeArrowheads="1" noChangeShapeType="1" noTextEdit="1"/>
+          </p:cNvSpPr>
+          <p:nvPr>
+            <p:extLst>
+              <p:ext uri="{386F3935-93C4-4BCD-93E2-E3B085C9AB24}">
+                <p16:designElem xmlns:p16="http://schemas.microsoft.com/office/powerpoint/2015/main" val="1"/>
+              </p:ext>
+            </p:extLst>
+          </p:nvPr>
+        </p:nvSpPr>
+        <p:spPr>
+          <a:xfrm>
+            <a:off x="446534" y="457200"/>
+            <a:ext cx="3703320" cy="94997"/>
+          </a:xfrm>
+          <a:prstGeom prst="rect">
+            <a:avLst/>
+          </a:prstGeom>
+          <a:solidFill>
+            <a:schemeClr val="accent1"/>
+          </a:solidFill>
+          <a:ln>
+            <a:noFill/>
+          </a:ln>
+          <a:effectLst/>
+        </p:spPr>
+        <p:style>
+          <a:lnRef idx="1">
+            <a:schemeClr val="accent1"/>
+          </a:lnRef>
+          <a:fillRef idx="3">
+            <a:schemeClr val="accent1"/>
+          </a:fillRef>
+          <a:effectRef idx="2">
+            <a:schemeClr val="accent1"/>
+          </a:effectRef>
+          <a:fontRef idx="minor">
+            <a:schemeClr val="lt1"/>
+          </a:fontRef>
+        </p:style>
+      </p:sp>
+      <p:sp>
+        <p:nvSpPr>
+          <p:cNvPr id="48" name="Rectangle 47">
+            <a:extLst>
+              <a:ext uri="{FF2B5EF4-FFF2-40B4-BE49-F238E27FC236}">
+                <a16:creationId xmlns:a16="http://schemas.microsoft.com/office/drawing/2014/main" id="{84D30AFB-4D71-48B0-AA00-28EE92363A5F}"/>
+              </a:ext>
+              <a:ext uri="{C183D7F6-B498-43B3-948B-1728B52AA6E4}">
+                <adec:decorative xmlns:adec="http://schemas.microsoft.com/office/drawing/2017/decorative" val="1"/>
+              </a:ext>
+            </a:extLst>
+          </p:cNvPr>
+          <p:cNvSpPr>
+            <a:spLocks noGrp="1" noRot="1" noChangeAspect="1" noMove="1" noResize="1" noEditPoints="1" noAdjustHandles="1" noChangeArrowheads="1" noChangeShapeType="1" noTextEdit="1"/>
+          </p:cNvSpPr>
+          <p:nvPr>
+            <p:extLst>
+              <p:ext uri="{386F3935-93C4-4BCD-93E2-E3B085C9AB24}">
+                <p16:designElem xmlns:p16="http://schemas.microsoft.com/office/powerpoint/2015/main" val="1"/>
+              </p:ext>
+            </p:extLst>
+          </p:nvPr>
+        </p:nvSpPr>
+        <p:spPr>
+          <a:xfrm>
+            <a:off x="8042147" y="453643"/>
+            <a:ext cx="3703320" cy="98554"/>
+          </a:xfrm>
+          <a:prstGeom prst="rect">
+            <a:avLst/>
+          </a:prstGeom>
+          <a:solidFill>
+            <a:schemeClr val="accent4"/>
+          </a:solidFill>
+          <a:ln>
+            <a:noFill/>
+          </a:ln>
+          <a:effectLst/>
+        </p:spPr>
+        <p:style>
+          <a:lnRef idx="1">
+            <a:schemeClr val="accent1"/>
+          </a:lnRef>
+          <a:fillRef idx="3">
+            <a:schemeClr val="accent1"/>
+          </a:fillRef>
+          <a:effectRef idx="2">
+            <a:schemeClr val="accent1"/>
+          </a:effectRef>
+          <a:fontRef idx="minor">
+            <a:schemeClr val="lt1"/>
+          </a:fontRef>
+        </p:style>
+      </p:sp>
+      <p:sp>
+        <p:nvSpPr>
+          <p:cNvPr id="50" name="Rectangle 49">
+            <a:extLst>
+              <a:ext uri="{FF2B5EF4-FFF2-40B4-BE49-F238E27FC236}">
+                <a16:creationId xmlns:a16="http://schemas.microsoft.com/office/drawing/2014/main" id="{96A0B76F-8010-4C62-B4B6-C5FC438C059E}"/>
+              </a:ext>
+              <a:ext uri="{C183D7F6-B498-43B3-948B-1728B52AA6E4}">
+                <adec:decorative xmlns:adec="http://schemas.microsoft.com/office/drawing/2017/decorative" val="1"/>
+              </a:ext>
+            </a:extLst>
+          </p:cNvPr>
+          <p:cNvSpPr>
+            <a:spLocks noGrp="1" noRot="1" noChangeAspect="1" noMove="1" noResize="1" noEditPoints="1" noAdjustHandles="1" noChangeArrowheads="1" noChangeShapeType="1" noTextEdit="1"/>
+          </p:cNvSpPr>
+          <p:nvPr>
+            <p:extLst>
+              <p:ext uri="{386F3935-93C4-4BCD-93E2-E3B085C9AB24}">
+                <p16:designElem xmlns:p16="http://schemas.microsoft.com/office/powerpoint/2015/main" val="1"/>
+              </p:ext>
+            </p:extLst>
+          </p:nvPr>
+        </p:nvSpPr>
+        <p:spPr>
+          <a:xfrm>
+            <a:off x="4241830" y="457200"/>
+            <a:ext cx="3703320" cy="91440"/>
+          </a:xfrm>
+          <a:prstGeom prst="rect">
+            <a:avLst/>
+          </a:prstGeom>
+          <a:solidFill>
+            <a:schemeClr val="accent2"/>
+          </a:solidFill>
+          <a:ln>
+            <a:noFill/>
+          </a:ln>
+          <a:effectLst/>
+        </p:spPr>
+        <p:style>
+          <a:lnRef idx="1">
+            <a:schemeClr val="accent1"/>
+          </a:lnRef>
+          <a:fillRef idx="3">
+            <a:schemeClr val="accent1"/>
+          </a:fillRef>
+          <a:effectRef idx="2">
+            <a:schemeClr val="accent1"/>
+          </a:effectRef>
+          <a:fontRef idx="minor">
+            <a:schemeClr val="lt1"/>
+          </a:fontRef>
+        </p:style>
+      </p:sp>
+      <p:sp>
+        <p:nvSpPr>
+          <p:cNvPr id="52" name="Rectangle 51">
+            <a:extLst>
+              <a:ext uri="{FF2B5EF4-FFF2-40B4-BE49-F238E27FC236}">
+                <a16:creationId xmlns:a16="http://schemas.microsoft.com/office/drawing/2014/main" id="{9FC936C0-4624-438D-BDD0-6B296BD6409D}"/>
+              </a:ext>
+              <a:ext uri="{C183D7F6-B498-43B3-948B-1728B52AA6E4}">
+                <adec:decorative xmlns:adec="http://schemas.microsoft.com/office/drawing/2017/decorative" val="1"/>
+              </a:ext>
+            </a:extLst>
+          </p:cNvPr>
+          <p:cNvSpPr>
+            <a:spLocks noGrp="1" noRot="1" noChangeAspect="1" noMove="1" noResize="1" noEditPoints="1" noAdjustHandles="1" noChangeArrowheads="1" noChangeShapeType="1" noTextEdit="1"/>
+          </p:cNvSpPr>
+          <p:nvPr>
+            <p:extLst>
+              <p:ext uri="{386F3935-93C4-4BCD-93E2-E3B085C9AB24}">
+                <p16:designElem xmlns:p16="http://schemas.microsoft.com/office/powerpoint/2015/main" val="1"/>
+              </p:ext>
+            </p:extLst>
+          </p:nvPr>
+        </p:nvSpPr>
+        <p:spPr>
+          <a:xfrm>
+            <a:off x="446534" y="3085765"/>
+            <a:ext cx="11262866" cy="3304800"/>
+          </a:xfrm>
+          <a:prstGeom prst="rect">
+            <a:avLst/>
+          </a:prstGeom>
+          <a:solidFill>
+            <a:schemeClr val="accent1"/>
+          </a:solidFill>
+          <a:ln>
+            <a:noFill/>
+          </a:ln>
+          <a:effectLst/>
+        </p:spPr>
+        <p:style>
+          <a:lnRef idx="1">
+            <a:schemeClr val="accent1"/>
+          </a:lnRef>
+          <a:fillRef idx="3">
+            <a:schemeClr val="accent1"/>
+          </a:fillRef>
+          <a:effectRef idx="2">
+            <a:schemeClr val="accent1"/>
+          </a:effectRef>
+          <a:fontRef idx="minor">
+            <a:schemeClr val="lt1"/>
+          </a:fontRef>
+        </p:style>
+      </p:sp>
+      <p:sp>
+        <p:nvSpPr>
+          <p:cNvPr id="54" name="Rectangle 53">
+            <a:extLst>
+              <a:ext uri="{FF2B5EF4-FFF2-40B4-BE49-F238E27FC236}">
+                <a16:creationId xmlns:a16="http://schemas.microsoft.com/office/drawing/2014/main" id="{E08D4B6A-8113-4DFB-B82E-B60CAC8E0A50}"/>
+              </a:ext>
+              <a:ext uri="{C183D7F6-B498-43B3-948B-1728B52AA6E4}">
+                <adec:decorative xmlns:adec="http://schemas.microsoft.com/office/drawing/2017/decorative" val="1"/>
+              </a:ext>
+            </a:extLst>
+          </p:cNvPr>
+          <p:cNvSpPr>
+            <a:spLocks noGrp="1" noRot="1" noChangeAspect="1" noMove="1" noResize="1" noEditPoints="1" noAdjustHandles="1" noChangeArrowheads="1" noChangeShapeType="1" noTextEdit="1"/>
+          </p:cNvSpPr>
+          <p:nvPr>
+            <p:extLst>
+              <p:ext uri="{386F3935-93C4-4BCD-93E2-E3B085C9AB24}">
+                <p16:designElem xmlns:p16="http://schemas.microsoft.com/office/powerpoint/2015/main" val="1"/>
+              </p:ext>
+            </p:extLst>
+          </p:nvPr>
+        </p:nvSpPr>
+        <p:spPr>
+          <a:xfrm>
+            <a:off x="0" y="0"/>
+            <a:ext cx="12192000" cy="6858000"/>
+          </a:xfrm>
+          <a:prstGeom prst="rect">
+            <a:avLst/>
+          </a:prstGeom>
+          <a:solidFill>
+            <a:srgbClr val="FFFFFF"/>
+          </a:solidFill>
+          <a:ln>
+            <a:noFill/>
+          </a:ln>
+        </p:spPr>
+        <p:style>
+          <a:lnRef idx="2">
+            <a:schemeClr val="accent1">
+              <a:shade val="50000"/>
+            </a:schemeClr>
+          </a:lnRef>
+          <a:fillRef idx="1">
+            <a:schemeClr val="accent1"/>
+          </a:fillRef>
+          <a:effectRef idx="0">
+            <a:schemeClr val="accent1"/>
+          </a:effectRef>
+          <a:fontRef idx="minor">
+            <a:schemeClr val="lt1"/>
+          </a:fontRef>
+        </p:style>
+        <p:txBody>
+          <a:bodyPr rtlCol="0" anchor="ctr"/>
+          <a:lstStyle/>
+          <a:p>
+            <a:pPr marL="0" marR="0" lvl="0" indent="0" algn="ctr" defTabSz="457200" rtl="0" eaLnBrk="1" fontAlgn="auto" latinLnBrk="0" hangingPunct="1">
+              <a:lnSpc>
+                <a:spcPct val="100000"/>
+              </a:lnSpc>
+              <a:spcBef>
+                <a:spcPts val="0"/>
+              </a:spcBef>
+              <a:spcAft>
+                <a:spcPts val="0"/>
+              </a:spcAft>
+              <a:buClrTx/>
+              <a:buSzTx/>
+              <a:buFontTx/>
+              <a:buNone/>
+              <a:tabLst/>
+              <a:defRPr/>
+            </a:pPr>
+            <a:endParaRPr kumimoji="0" lang="en-US" sz="1800" b="0" i="0" u="none" strike="noStrike" kern="1200" cap="none" spc="0" normalizeH="0" baseline="0" noProof="0">
+              <a:ln>
+                <a:noFill/>
+              </a:ln>
+              <a:solidFill>
+                <a:prstClr val="white"/>
+              </a:solidFill>
+              <a:effectLst/>
+              <a:uLnTx/>
+              <a:uFillTx/>
+              <a:latin typeface="Gill Sans MT" panose="020B0502020104020203"/>
+              <a:ea typeface="+mn-ea"/>
+              <a:cs typeface="+mn-cs"/>
+            </a:endParaRPr>
+          </a:p>
+        </p:txBody>
+      </p:sp>
+      <p:sp>
+        <p:nvSpPr>
+          <p:cNvPr id="56" name="Rectangle 55">
+            <a:extLst>
+              <a:ext uri="{FF2B5EF4-FFF2-40B4-BE49-F238E27FC236}">
+                <a16:creationId xmlns:a16="http://schemas.microsoft.com/office/drawing/2014/main" id="{9822E561-F97C-4CBB-A9A6-A6BF6317BC84}"/>
+              </a:ext>
+              <a:ext uri="{C183D7F6-B498-43B3-948B-1728B52AA6E4}">
+                <adec:decorative xmlns:adec="http://schemas.microsoft.com/office/drawing/2017/decorative" val="1"/>
+              </a:ext>
+            </a:extLst>
+          </p:cNvPr>
+          <p:cNvSpPr>
+            <a:spLocks noGrp="1" noRot="1" noChangeAspect="1" noMove="1" noResize="1" noEditPoints="1" noAdjustHandles="1" noChangeArrowheads="1" noChangeShapeType="1" noTextEdit="1"/>
+          </p:cNvSpPr>
+          <p:nvPr>
+            <p:extLst>
+              <p:ext uri="{386F3935-93C4-4BCD-93E2-E3B085C9AB24}">
+                <p16:designElem xmlns:p16="http://schemas.microsoft.com/office/powerpoint/2015/main" val="1"/>
+              </p:ext>
+            </p:extLst>
+          </p:nvPr>
+        </p:nvSpPr>
+        <p:spPr>
+          <a:xfrm>
+            <a:off x="0" y="0"/>
+            <a:ext cx="12192000" cy="6858000"/>
+          </a:xfrm>
+          <a:prstGeom prst="rect">
+            <a:avLst/>
+          </a:prstGeom>
+          <a:solidFill>
+            <a:schemeClr val="accent1"/>
+          </a:solidFill>
+          <a:ln>
+            <a:noFill/>
+          </a:ln>
+          <a:effectLst/>
+        </p:spPr>
+        <p:style>
+          <a:lnRef idx="1">
+            <a:schemeClr val="accent1"/>
+          </a:lnRef>
+          <a:fillRef idx="3">
+            <a:schemeClr val="accent1"/>
+          </a:fillRef>
+          <a:effectRef idx="2">
+            <a:schemeClr val="accent1"/>
+          </a:effectRef>
+          <a:fontRef idx="minor">
+            <a:schemeClr val="lt1"/>
+          </a:fontRef>
+        </p:style>
+      </p:sp>
+      <p:sp>
+        <p:nvSpPr>
+          <p:cNvPr id="58" name="Rectangle 57">
+            <a:extLst>
+              <a:ext uri="{FF2B5EF4-FFF2-40B4-BE49-F238E27FC236}">
+                <a16:creationId xmlns:a16="http://schemas.microsoft.com/office/drawing/2014/main" id="{B01B0E58-A5C8-4CDA-A2E0-35DF94E59857}"/>
+              </a:ext>
+              <a:ext uri="{C183D7F6-B498-43B3-948B-1728B52AA6E4}">
+                <adec:decorative xmlns:adec="http://schemas.microsoft.com/office/drawing/2017/decorative" val="1"/>
+              </a:ext>
+            </a:extLst>
+          </p:cNvPr>
+          <p:cNvSpPr>
+            <a:spLocks noGrp="1" noRot="1" noChangeAspect="1" noMove="1" noResize="1" noEditPoints="1" noAdjustHandles="1" noChangeArrowheads="1" noChangeShapeType="1" noTextEdit="1"/>
+          </p:cNvSpPr>
+          <p:nvPr>
+            <p:extLst>
+              <p:ext uri="{386F3935-93C4-4BCD-93E2-E3B085C9AB24}">
+                <p16:designElem xmlns:p16="http://schemas.microsoft.com/office/powerpoint/2015/main" val="1"/>
+              </p:ext>
+            </p:extLst>
+          </p:nvPr>
+        </p:nvSpPr>
+        <p:spPr>
+          <a:xfrm>
+            <a:off x="638620" y="457200"/>
+            <a:ext cx="3511233" cy="91439"/>
+          </a:xfrm>
+          <a:prstGeom prst="rect">
+            <a:avLst/>
+          </a:prstGeom>
+          <a:solidFill>
+            <a:schemeClr val="accent2"/>
+          </a:solidFill>
+          <a:ln>
+            <a:noFill/>
+          </a:ln>
+          <a:effectLst/>
+        </p:spPr>
+        <p:style>
+          <a:lnRef idx="1">
+            <a:schemeClr val="accent1"/>
+          </a:lnRef>
+          <a:fillRef idx="3">
+            <a:schemeClr val="accent1"/>
+          </a:fillRef>
+          <a:effectRef idx="2">
+            <a:schemeClr val="accent1"/>
+          </a:effectRef>
+          <a:fontRef idx="minor">
+            <a:schemeClr val="lt1"/>
+          </a:fontRef>
+        </p:style>
+      </p:sp>
+      <p:sp>
+        <p:nvSpPr>
+          <p:cNvPr id="13" name="TextBox 7">
+            <a:extLst>
+              <a:ext uri="{FF2B5EF4-FFF2-40B4-BE49-F238E27FC236}">
+                <a16:creationId xmlns:a16="http://schemas.microsoft.com/office/drawing/2014/main" id="{AE982F09-096F-4E31-9F65-2032E3CCFDC9}"/>
+              </a:ext>
+            </a:extLst>
+          </p:cNvPr>
+          <p:cNvSpPr txBox="1"/>
+          <p:nvPr/>
+        </p:nvSpPr>
+        <p:spPr>
+          <a:xfrm>
+            <a:off x="638620" y="2934034"/>
+            <a:ext cx="3603210" cy="1192071"/>
+          </a:xfrm>
+          <a:prstGeom prst="rect">
+            <a:avLst/>
+          </a:prstGeom>
+        </p:spPr>
+        <p:txBody>
+          <a:bodyPr rot="0" spcFirstLastPara="0" vertOverflow="overflow" horzOverflow="overflow" vert="horz" lIns="91440" tIns="45720" rIns="91440" bIns="45720" numCol="1" spcCol="0" rtlCol="0" fromWordArt="0" anchor="ctr" anchorCtr="0" forceAA="0" compatLnSpc="1">
+            <a:prstTxWarp prst="textNoShape">
+              <a:avLst/>
+            </a:prstTxWarp>
+            <a:normAutofit fontScale="92500"/>
+          </a:bodyPr>
+          <a:lstStyle/>
+          <a:p>
+            <a:pPr algn="ctr" defTabSz="457200">
+              <a:spcBef>
+                <a:spcPct val="0"/>
+              </a:spcBef>
+              <a:spcAft>
+                <a:spcPts val="600"/>
+              </a:spcAft>
+            </a:pPr>
+            <a:r>
+              <a:rPr lang="pt-BR" sz="3600" cap="all" dirty="0">
+                <a:solidFill>
+                  <a:srgbClr val="FFFFFF"/>
+                </a:solidFill>
+                <a:latin typeface="+mj-lt"/>
+                <a:ea typeface="+mj-ea"/>
+                <a:cs typeface="+mj-cs"/>
+              </a:rPr>
+              <a:t>Classificação</a:t>
+            </a:r>
+          </a:p>
+          <a:p>
+            <a:pPr algn="ctr" defTabSz="457200">
+              <a:spcBef>
+                <a:spcPct val="0"/>
+              </a:spcBef>
+              <a:spcAft>
+                <a:spcPts val="600"/>
+              </a:spcAft>
+            </a:pPr>
+            <a:r>
+              <a:rPr lang="pt-BR" sz="3600" cap="all" dirty="0">
+                <a:solidFill>
+                  <a:srgbClr val="FFFFFF"/>
+                </a:solidFill>
+                <a:latin typeface="+mj-lt"/>
+                <a:ea typeface="+mj-ea"/>
+                <a:cs typeface="+mj-cs"/>
+              </a:rPr>
+              <a:t>Dos requisitos</a:t>
+            </a:r>
+          </a:p>
+        </p:txBody>
+      </p:sp>
+      <p:pic>
+        <p:nvPicPr>
+          <p:cNvPr id="5" name="Imagem 4">
+            <a:extLst>
+              <a:ext uri="{FF2B5EF4-FFF2-40B4-BE49-F238E27FC236}">
+                <a16:creationId xmlns:a16="http://schemas.microsoft.com/office/drawing/2014/main" id="{9AAA2A15-1711-47E9-B4CA-041361E76E85}"/>
+              </a:ext>
+            </a:extLst>
+          </p:cNvPr>
+          <p:cNvPicPr>
+            <a:picLocks noChangeAspect="1"/>
+          </p:cNvPicPr>
+          <p:nvPr/>
+        </p:nvPicPr>
+        <p:blipFill>
+          <a:blip r:embed="rId2" cstate="print">
+            <a:extLst>
+              <a:ext uri="{28A0092B-C50C-407E-A947-70E740481C1C}">
+                <a14:useLocalDpi xmlns:a14="http://schemas.microsoft.com/office/drawing/2010/main" val="0"/>
+              </a:ext>
+            </a:extLst>
+          </a:blip>
+          <a:stretch>
+            <a:fillRect/>
+          </a:stretch>
+        </p:blipFill>
+        <p:spPr>
+          <a:xfrm>
+            <a:off x="5881348" y="1228280"/>
+            <a:ext cx="5501800" cy="4401440"/>
+          </a:xfrm>
+          <a:prstGeom prst="rect">
+            <a:avLst/>
+          </a:prstGeom>
+          <a:ln w="228600" cap="sq" cmpd="thickThin">
+            <a:solidFill>
+              <a:schemeClr val="accent2">
+                <a:lumMod val="75000"/>
+              </a:schemeClr>
+            </a:solidFill>
+            <a:prstDash val="solid"/>
+            <a:miter lim="800000"/>
+          </a:ln>
+          <a:effectLst>
+            <a:innerShdw blurRad="76200">
+              <a:srgbClr val="000000"/>
+            </a:innerShdw>
+          </a:effectLst>
+        </p:spPr>
+      </p:pic>
+    </p:spTree>
+    <p:extLst>
+      <p:ext uri="{BB962C8B-B14F-4D97-AF65-F5344CB8AC3E}">
+        <p14:creationId xmlns:p14="http://schemas.microsoft.com/office/powerpoint/2010/main" val="122387807"/>
       </p:ext>
     </p:extLst>
   </p:cSld>

</xml_diff>